<commit_message>
Committing updates for Inheritance.
</commit_message>
<xml_diff>
--- a/courseMaterial/Inheritance/Inheritance.pptx
+++ b/courseMaterial/Inheritance/Inheritance.pptx
@@ -21,19 +21,19 @@
     <p:sldId id="311" r:id="rId12"/>
     <p:sldId id="312" r:id="rId13"/>
     <p:sldId id="313" r:id="rId14"/>
-    <p:sldId id="295" r:id="rId15"/>
-    <p:sldId id="299" r:id="rId16"/>
-    <p:sldId id="300" r:id="rId17"/>
-    <p:sldId id="304" r:id="rId18"/>
+    <p:sldId id="299" r:id="rId15"/>
+    <p:sldId id="300" r:id="rId16"/>
+    <p:sldId id="304" r:id="rId17"/>
+    <p:sldId id="314" r:id="rId18"/>
     <p:sldId id="301" r:id="rId19"/>
-    <p:sldId id="303" r:id="rId20"/>
+    <p:sldId id="297" r:id="rId20"/>
     <p:sldId id="283" r:id="rId21"/>
-    <p:sldId id="297" r:id="rId22"/>
+    <p:sldId id="315" r:id="rId22"/>
     <p:sldId id="302" r:id="rId23"/>
-    <p:sldId id="305" r:id="rId24"/>
-    <p:sldId id="306" r:id="rId25"/>
-    <p:sldId id="307" r:id="rId26"/>
-    <p:sldId id="298" r:id="rId27"/>
+    <p:sldId id="298" r:id="rId24"/>
+    <p:sldId id="316" r:id="rId25"/>
+    <p:sldId id="306" r:id="rId26"/>
+    <p:sldId id="307" r:id="rId27"/>
     <p:sldId id="268" r:id="rId28"/>
   </p:sldIdLst>
   <p:sldSz cx="12192000" cy="6858000"/>
@@ -238,7 +238,7 @@
           <a:p>
             <a:fld id="{68416927-5E9C-4E77-85FE-EE4C81C1DE39}" type="datetimeFigureOut">
               <a:rPr lang="en-US" smtClean="0"/>
-              <a:t>4/26/2020</a:t>
+              <a:t>4/28/2020</a:t>
             </a:fld>
             <a:endParaRPr lang="en-US" dirty="0"/>
           </a:p>
@@ -415,7 +415,7 @@
           <a:p>
             <a:fld id="{FA798B7E-6604-4F74-86DB-B30627D56244}" type="datetimeFigureOut">
               <a:rPr lang="en-US" smtClean="0"/>
-              <a:t>4/26/2020</a:t>
+              <a:t>4/28/2020</a:t>
             </a:fld>
             <a:endParaRPr lang="en-US" dirty="0"/>
           </a:p>
@@ -4945,7 +4945,7 @@
             <a:pPr algn="ctr"/>
             <a:r>
               <a:rPr lang="en-US" dirty="0" smtClean="0"/>
-              <a:t>Stack Trace &amp; Exceptions</a:t>
+              <a:t>Abstract Classes</a:t>
             </a:r>
             <a:endParaRPr lang="en-US" dirty="0"/>
           </a:p>
@@ -4970,60 +4970,70 @@
         <p:spPr>
           <a:xfrm>
             <a:off x="838199" y="1825625"/>
-            <a:ext cx="10515599" cy="4351338"/>
+            <a:ext cx="6689437" cy="4351338"/>
           </a:xfrm>
         </p:spPr>
         <p:txBody>
           <a:bodyPr>
-            <a:normAutofit fontScale="85000" lnSpcReduction="10000"/>
+            <a:normAutofit/>
           </a:bodyPr>
           <a:lstStyle/>
           <a:p>
             <a:r>
-              <a:rPr lang="en-US" sz="2800" dirty="0" smtClean="0"/>
-              <a:t>Java exception handling mechanism is based upon a throw-catch architecture. Whenever an unwanted situation is arrived at, an exception is ‘thrown’. This exception is then ‘caught’ by a specific piece of code. This is referred to as ‘exception handler’.</a:t>
-            </a:r>
-          </a:p>
-          <a:p>
-            <a:r>
-              <a:rPr lang="en-US" sz="2800" dirty="0" smtClean="0"/>
-              <a:t>The exception is thrown at runtime either by the program itself if it encounters a specific unexpected situation or it can be thrown by the JVM.</a:t>
-            </a:r>
-          </a:p>
-          <a:p>
-            <a:r>
-              <a:rPr lang="en-US" sz="2800" dirty="0" smtClean="0"/>
-              <a:t>The exception can be caught at the point where it is raised or it can be propagated down the stack trace all the way to the first method call. If no piece of code handles the exception all the way down the full stack then JVM acts as the </a:t>
-            </a:r>
-            <a:r>
-              <a:rPr lang="en-US" sz="2800" b="1" i="1" u="sng" dirty="0" smtClean="0"/>
-              <a:t>default exception handler </a:t>
-            </a:r>
-            <a:r>
-              <a:rPr lang="en-US" sz="2800" dirty="0" smtClean="0"/>
-              <a:t>and terminates the current program printing the entire stack trace till the point where exception first occurred</a:t>
-            </a:r>
-            <a:r>
-              <a:rPr lang="en-US" sz="2800" dirty="0"/>
-              <a:t>. An uncaught exception results in the death of the thread in which the exception occurred.</a:t>
-            </a:r>
-          </a:p>
-          <a:p>
-            <a:r>
-              <a:rPr lang="en-US" sz="2800" dirty="0" smtClean="0"/>
-              <a:t>This entire process together is referred to as </a:t>
-            </a:r>
-            <a:r>
-              <a:rPr lang="en-US" sz="2800" b="1" i="1" u="sng" dirty="0" smtClean="0"/>
-              <a:t>try-catch-finally</a:t>
-            </a:r>
-            <a:r>
-              <a:rPr lang="en-US" sz="2800" dirty="0" smtClean="0"/>
-              <a:t> construct.</a:t>
-            </a:r>
-          </a:p>
-          <a:p>
-            <a:endParaRPr lang="en-US" sz="2600" dirty="0" smtClean="0"/>
+              <a:rPr lang="en-US" dirty="0"/>
+              <a:t>A home represents a place which provides all living beings with shelter and safety. However, home is a concept while flat, row house or farm house is an actuality.</a:t>
+            </a:r>
+          </a:p>
+          <a:p>
+            <a:r>
+              <a:rPr lang="en-US" dirty="0"/>
+              <a:t>Similarly Country represents a land where people live and share a </a:t>
+            </a:r>
+            <a:r>
+              <a:rPr lang="en-US" dirty="0" smtClean="0"/>
+              <a:t>common idea of homeland. </a:t>
+            </a:r>
+            <a:r>
+              <a:rPr lang="en-US" dirty="0"/>
+              <a:t>However, country is a concept while India , USA, China are an actuality.</a:t>
+            </a:r>
+          </a:p>
+          <a:p>
+            <a:r>
+              <a:rPr lang="en-US" dirty="0"/>
+              <a:t>Based on similar lines we have abstract classes in java. These are those classes which cannot be instantiated</a:t>
+            </a:r>
+            <a:r>
+              <a:rPr lang="en-US" dirty="0" smtClean="0"/>
+              <a:t>.</a:t>
+            </a:r>
+          </a:p>
+          <a:p>
+            <a:r>
+              <a:rPr lang="en-US" dirty="0" smtClean="0"/>
+              <a:t>An </a:t>
+            </a:r>
+            <a:r>
+              <a:rPr lang="en-US" dirty="0"/>
+              <a:t>important part of being an abstract class is that </a:t>
+            </a:r>
+            <a:r>
+              <a:rPr lang="en-US" dirty="0" smtClean="0"/>
+              <a:t>it can </a:t>
+            </a:r>
+            <a:r>
+              <a:rPr lang="en-US" dirty="0"/>
+              <a:t>have certain methods which can be left unimplemented by declaring them abstract while there can be some which can be fully implemented.</a:t>
+            </a:r>
+          </a:p>
+          <a:p>
+            <a:endParaRPr lang="en-US" dirty="0" smtClean="0"/>
+          </a:p>
+          <a:p>
+            <a:endParaRPr lang="en-US" noProof="1" smtClean="0"/>
+          </a:p>
+          <a:p>
+            <a:endParaRPr lang="en-US" noProof="1"/>
           </a:p>
         </p:txBody>
       </p:sp>
@@ -5124,10 +5134,40 @@
           </a:p>
         </p:txBody>
       </p:sp>
+      <p:pic>
+        <p:nvPicPr>
+          <p:cNvPr id="5" name="Picture 4"/>
+          <p:cNvPicPr>
+            <a:picLocks noChangeAspect="1"/>
+          </p:cNvPicPr>
+          <p:nvPr/>
+        </p:nvPicPr>
+        <p:blipFill>
+          <a:blip r:embed="rId2">
+            <a:extLst>
+              <a:ext uri="{28A0092B-C50C-407E-A947-70E740481C1C}">
+                <a14:useLocalDpi xmlns:a14="http://schemas.microsoft.com/office/drawing/2010/main" val="0"/>
+              </a:ext>
+            </a:extLst>
+          </a:blip>
+          <a:stretch>
+            <a:fillRect/>
+          </a:stretch>
+        </p:blipFill>
+        <p:spPr>
+          <a:xfrm>
+            <a:off x="8343744" y="1825625"/>
+            <a:ext cx="3010055" cy="4011757"/>
+          </a:xfrm>
+          <a:prstGeom prst="rect">
+            <a:avLst/>
+          </a:prstGeom>
+        </p:spPr>
+      </p:pic>
     </p:spTree>
     <p:extLst>
       <p:ext uri="{BB962C8B-B14F-4D97-AF65-F5344CB8AC3E}">
-        <p14:creationId xmlns:p14="http://schemas.microsoft.com/office/powerpoint/2010/main" val="1446688970"/>
+        <p14:creationId xmlns:p14="http://schemas.microsoft.com/office/powerpoint/2010/main" val="2081229395"/>
       </p:ext>
     </p:extLst>
   </p:cSld>
@@ -5189,9 +5229,10 @@
           <a:p>
             <a:pPr algn="ctr"/>
             <a:r>
-              <a:rPr lang="en-US" dirty="0"/>
-              <a:t>Exception Hierarchy</a:t>
-            </a:r>
+              <a:rPr lang="en-US" dirty="0" smtClean="0"/>
+              <a:t>Abstract Classes</a:t>
+            </a:r>
+            <a:endParaRPr lang="en-US" dirty="0"/>
           </a:p>
         </p:txBody>
       </p:sp>
@@ -5214,90 +5255,54 @@
         <p:spPr>
           <a:xfrm>
             <a:off x="838199" y="1825625"/>
-            <a:ext cx="6689437" cy="4351338"/>
+            <a:ext cx="10515599" cy="4351338"/>
           </a:xfrm>
         </p:spPr>
         <p:txBody>
           <a:bodyPr>
-            <a:normAutofit fontScale="92500" lnSpcReduction="20000"/>
+            <a:normAutofit/>
           </a:bodyPr>
           <a:lstStyle/>
           <a:p>
             <a:r>
-              <a:rPr lang="en-US" dirty="0" smtClean="0"/>
-              <a:t>When an exception is raised, actually an object denoting the concerned exception is created.</a:t>
-            </a:r>
-          </a:p>
-          <a:p>
-            <a:r>
-              <a:rPr lang="en-US" dirty="0" smtClean="0"/>
-              <a:t>An exception object wraps inside of it a message denoting the root cause of exception. Along with this it also contains the </a:t>
-            </a:r>
-            <a:r>
-              <a:rPr lang="en-US" dirty="0" err="1" smtClean="0"/>
-              <a:t>Stacktrace</a:t>
-            </a:r>
-            <a:r>
-              <a:rPr lang="en-US" dirty="0" smtClean="0"/>
-              <a:t> of the method that raised  the exception.</a:t>
-            </a:r>
-          </a:p>
-          <a:p>
-            <a:r>
-              <a:rPr lang="en-US" dirty="0" err="1" smtClean="0"/>
-              <a:t>Throwable</a:t>
-            </a:r>
-            <a:r>
-              <a:rPr lang="en-US" dirty="0" smtClean="0"/>
-              <a:t> interface is the root of the entire exception class hierarchy.</a:t>
-            </a:r>
-          </a:p>
-          <a:p>
-            <a:r>
-              <a:rPr lang="en-US" dirty="0" smtClean="0"/>
-              <a:t>Errors are the situations which cannot be recovered. Hence most probably the only option in such cases is too abort the program execution. Some examples are : </a:t>
-            </a:r>
-          </a:p>
-          <a:p>
-            <a:pPr lvl="1"/>
-            <a:r>
-              <a:rPr lang="en-US" dirty="0" err="1" smtClean="0"/>
-              <a:t>StackOverFlowError</a:t>
-            </a:r>
-            <a:endParaRPr lang="en-US" dirty="0" smtClean="0"/>
-          </a:p>
-          <a:p>
-            <a:pPr lvl="1"/>
-            <a:r>
-              <a:rPr lang="en-US" dirty="0" err="1" smtClean="0"/>
-              <a:t>OutOfMemoryError</a:t>
-            </a:r>
-            <a:endParaRPr lang="en-US" dirty="0" smtClean="0"/>
-          </a:p>
-          <a:p>
-            <a:r>
-              <a:rPr lang="en-US" dirty="0" err="1" smtClean="0"/>
-              <a:t>RuntimeException</a:t>
-            </a:r>
-            <a:r>
-              <a:rPr lang="en-US" dirty="0" smtClean="0"/>
-              <a:t> are those classes which denote those class of exception that may occur at runtime and that are mostly caused by programming errors.</a:t>
-            </a:r>
-          </a:p>
-          <a:p>
-            <a:r>
-              <a:rPr lang="en-US" dirty="0" smtClean="0"/>
-              <a:t>All other exceptions lie under Exception class hierarchy.</a:t>
-            </a:r>
-          </a:p>
-          <a:p>
-            <a:endParaRPr lang="en-US" dirty="0" smtClean="0"/>
-          </a:p>
-          <a:p>
-            <a:endParaRPr lang="en-US" noProof="1" smtClean="0"/>
-          </a:p>
-          <a:p>
-            <a:endParaRPr lang="en-US" noProof="1"/>
+              <a:rPr lang="en-US" sz="2800" dirty="0" smtClean="0"/>
+              <a:t>Abstract classes are declared as abstract.</a:t>
+            </a:r>
+          </a:p>
+          <a:p>
+            <a:r>
+              <a:rPr lang="en-US" sz="2800" dirty="0" smtClean="0"/>
+              <a:t>Abstract classes have one or more methods defined as abstract. These are those methods which are intended to be left unimplemented. The y just have the method declaration but no </a:t>
+            </a:r>
+            <a:r>
+              <a:rPr lang="en-US" sz="2800" dirty="0"/>
+              <a:t>b</a:t>
+            </a:r>
+            <a:r>
+              <a:rPr lang="en-US" sz="2800" dirty="0" smtClean="0"/>
+              <a:t>ody.</a:t>
+            </a:r>
+          </a:p>
+          <a:p>
+            <a:r>
+              <a:rPr lang="en-US" sz="2800" dirty="0" smtClean="0"/>
+              <a:t>It can also have methods which are given fully implemented.</a:t>
+            </a:r>
+          </a:p>
+          <a:p>
+            <a:r>
+              <a:rPr lang="en-US" sz="2800" dirty="0" smtClean="0"/>
+              <a:t>If a class chooses to extend the abstract class, then it is required that it gives definition to all the abstract methods from the parent class. </a:t>
+            </a:r>
+          </a:p>
+          <a:p>
+            <a:r>
+              <a:rPr lang="en-US" sz="2800" dirty="0" smtClean="0"/>
+              <a:t>However if a class intends to partially implement an abstract class , then it will also have to declare itself abstract.</a:t>
+            </a:r>
+          </a:p>
+          <a:p>
+            <a:endParaRPr lang="en-US" sz="2800" dirty="0"/>
           </a:p>
         </p:txBody>
       </p:sp>
@@ -5398,51 +5403,10 @@
           </a:p>
         </p:txBody>
       </p:sp>
-      <p:pic>
-        <p:nvPicPr>
-          <p:cNvPr id="8" name="Picture 10" descr="Java - Exceptions - Tutorialspoint"/>
-          <p:cNvPicPr>
-            <a:picLocks noChangeAspect="1" noChangeArrowheads="1"/>
-          </p:cNvPicPr>
-          <p:nvPr/>
-        </p:nvPicPr>
-        <p:blipFill>
-          <a:blip r:embed="rId2">
-            <a:extLst>
-              <a:ext uri="{28A0092B-C50C-407E-A947-70E740481C1C}">
-                <a14:useLocalDpi xmlns:a14="http://schemas.microsoft.com/office/drawing/2010/main" val="0"/>
-              </a:ext>
-            </a:extLst>
-          </a:blip>
-          <a:srcRect/>
-          <a:stretch>
-            <a:fillRect/>
-          </a:stretch>
-        </p:blipFill>
-        <p:spPr bwMode="auto">
-          <a:xfrm>
-            <a:off x="7924800" y="1978891"/>
-            <a:ext cx="3428998" cy="4198072"/>
-          </a:xfrm>
-          <a:prstGeom prst="rect">
-            <a:avLst/>
-          </a:prstGeom>
-          <a:noFill/>
-          <a:extLst>
-            <a:ext uri="{909E8E84-426E-40DD-AFC4-6F175D3DCCD1}">
-              <a14:hiddenFill xmlns:a14="http://schemas.microsoft.com/office/drawing/2010/main">
-                <a:solidFill>
-                  <a:srgbClr val="FFFFFF"/>
-                </a:solidFill>
-              </a14:hiddenFill>
-            </a:ext>
-          </a:extLst>
-        </p:spPr>
-      </p:pic>
     </p:spTree>
     <p:extLst>
       <p:ext uri="{BB962C8B-B14F-4D97-AF65-F5344CB8AC3E}">
-        <p14:creationId xmlns:p14="http://schemas.microsoft.com/office/powerpoint/2010/main" val="2081229395"/>
+        <p14:creationId xmlns:p14="http://schemas.microsoft.com/office/powerpoint/2010/main" val="570373965"/>
       </p:ext>
     </p:extLst>
   </p:cSld>
@@ -5505,7 +5469,7 @@
             <a:pPr algn="ctr"/>
             <a:r>
               <a:rPr lang="en-US" dirty="0" smtClean="0"/>
-              <a:t>Try-Catch or Throws Choice</a:t>
+              <a:t>Polymorphism</a:t>
             </a:r>
             <a:endParaRPr lang="en-US" dirty="0"/>
           </a:p>
@@ -5535,37 +5499,13 @@
         </p:spPr>
         <p:txBody>
           <a:bodyPr>
-            <a:normAutofit fontScale="70000" lnSpcReduction="20000"/>
+            <a:normAutofit/>
           </a:bodyPr>
           <a:lstStyle/>
           <a:p>
             <a:r>
               <a:rPr lang="en-US" sz="2800" dirty="0" smtClean="0"/>
-              <a:t>In general when writing it is a common scenario that there are components or modules and then there are users of that module. Developer of the module generally specifies the input parameters for the module and return type. Apart from this if he thinks that he cannot handle a specific exception that occurs during the module execution then he can choose to delegate that exception to the user/caller of that module. This is referred to as module “throws” the exception to its caller.</a:t>
-            </a:r>
-          </a:p>
-          <a:p>
-            <a:r>
-              <a:rPr lang="en-US" sz="2800" dirty="0" smtClean="0"/>
-              <a:t>On the other hand caller of the module chooses to handle the exception locally, he can put the exception raising module usage in the try block and correspondingly put a “catch” block containing the code to successfully recover from the exception</a:t>
-            </a:r>
-          </a:p>
-          <a:p>
-            <a:r>
-              <a:rPr lang="en-US" sz="2800" dirty="0" smtClean="0"/>
-              <a:t>Alternatively the caller could also decide to delegate the exception further up the call hierarchy. In this case he could also say to its calling component that the code “throws” an exception.</a:t>
-            </a:r>
-          </a:p>
-          <a:p>
-            <a:r>
-              <a:rPr lang="en-US" sz="2800" dirty="0" smtClean="0"/>
-              <a:t>So conclusively there are two things every programmer can do about exceptions. Either to handle it locally using the try-catch block or “throws” the exception to its calling component.</a:t>
-            </a:r>
-          </a:p>
-          <a:p>
-            <a:r>
-              <a:rPr lang="en-US" sz="2800" dirty="0" smtClean="0"/>
-              <a:t>Using the “throws” way, if the exception keeps getting propagated down stack trace and ultimately if no code handles it then, JVM becomes the default handler and throws it out to the end user with the appropriate message and full stack trace down to the point where exception occurred.</a:t>
+              <a:t>With inheritance in place, the program is at liberty to play around with a reference and the object.</a:t>
             </a:r>
             <a:endParaRPr lang="en-US" sz="2800" dirty="0"/>
           </a:p>
@@ -5671,7 +5611,7 @@
     </p:spTree>
     <p:extLst>
       <p:ext uri="{BB962C8B-B14F-4D97-AF65-F5344CB8AC3E}">
-        <p14:creationId xmlns:p14="http://schemas.microsoft.com/office/powerpoint/2010/main" val="570373965"/>
+        <p14:creationId xmlns:p14="http://schemas.microsoft.com/office/powerpoint/2010/main" val="1262960452"/>
       </p:ext>
     </p:extLst>
   </p:cSld>
@@ -5734,7 +5674,7 @@
             <a:pPr algn="ctr"/>
             <a:r>
               <a:rPr lang="en-US" dirty="0" smtClean="0"/>
-              <a:t>Try-Catch block</a:t>
+              <a:t>Polymorphism</a:t>
             </a:r>
             <a:endParaRPr lang="en-US" dirty="0"/>
           </a:p>
@@ -5759,44 +5699,60 @@
         <p:spPr>
           <a:xfrm>
             <a:off x="838199" y="1825625"/>
-            <a:ext cx="10515599" cy="4351338"/>
+            <a:ext cx="6689437" cy="4351338"/>
           </a:xfrm>
         </p:spPr>
         <p:txBody>
           <a:bodyPr>
-            <a:normAutofit fontScale="92500" lnSpcReduction="20000"/>
+            <a:normAutofit/>
           </a:bodyPr>
           <a:lstStyle/>
           <a:p>
             <a:r>
-              <a:rPr lang="en-US" sz="2800" dirty="0" smtClean="0"/>
-              <a:t>A try block is the one which contains all the code that could potentially lead to an exception.</a:t>
-            </a:r>
-          </a:p>
-          <a:p>
-            <a:r>
-              <a:rPr lang="en-US" sz="2800" dirty="0" smtClean="0"/>
-              <a:t>The try block can be followed by one or more catch blocks. Order of catch blocks is important.</a:t>
-            </a:r>
-          </a:p>
-          <a:p>
-            <a:r>
-              <a:rPr lang="en-US" sz="2800" dirty="0" smtClean="0"/>
-              <a:t>Multiple catch blocks should be written in such a way that exception classes lower in the hierarchy should appear first while the higher one should come later.</a:t>
-            </a:r>
-          </a:p>
-          <a:p>
-            <a:r>
-              <a:rPr lang="en-US" sz="2800" dirty="0" smtClean="0"/>
-              <a:t>If we try to put an exception class higher in the hierarchy above the class which is lower in the hierarchy then the catch block containing the lower exception class becomes unreachable.</a:t>
-            </a:r>
-          </a:p>
-          <a:p>
-            <a:r>
-              <a:rPr lang="en-US" sz="2800" dirty="0" smtClean="0"/>
-              <a:t>Since a parent class present in a higher catch block hence lower catch blocks would never be able to catch an exception.</a:t>
-            </a:r>
-            <a:endParaRPr lang="en-US" sz="2800" dirty="0"/>
+              <a:rPr lang="en-US" dirty="0" smtClean="0"/>
+              <a:t>With inheritance in our armory, we can now start playing around with the world of OOPS!!!</a:t>
+            </a:r>
+          </a:p>
+          <a:p>
+            <a:r>
+              <a:rPr lang="en-US" dirty="0" smtClean="0"/>
+              <a:t>Enter </a:t>
+            </a:r>
+            <a:r>
+              <a:rPr lang="en-US" dirty="0"/>
+              <a:t>polymorphism</a:t>
+            </a:r>
+            <a:r>
+              <a:rPr lang="en-US" dirty="0" smtClean="0"/>
+              <a:t>. Let the game begin.</a:t>
+            </a:r>
+            <a:endParaRPr lang="en-US" dirty="0"/>
+          </a:p>
+          <a:p>
+            <a:r>
+              <a:rPr lang="en-US" noProof="1" smtClean="0"/>
+              <a:t>With inheritance in place, a super class reference can point to any of the subclass object. This is referred to as polymorphism.</a:t>
+            </a:r>
+          </a:p>
+          <a:p>
+            <a:r>
+              <a:rPr lang="en-US" noProof="1" smtClean="0"/>
+              <a:t>Combined with polymorphism is concept of </a:t>
+            </a:r>
+            <a:r>
+              <a:rPr lang="en-US" b="1" i="1" u="sng" noProof="1" smtClean="0"/>
+              <a:t>dynamic method lookup</a:t>
+            </a:r>
+            <a:r>
+              <a:rPr lang="en-US" noProof="1" smtClean="0"/>
+              <a:t>. Dynamic method lookup as the name suggests invokes a method based on the runtime type of the object.</a:t>
+            </a:r>
+          </a:p>
+          <a:p>
+            <a:r>
+              <a:rPr lang="en-US" noProof="1" smtClean="0"/>
+              <a:t>As the picture says, when an animal is asked to speak, each speaks out in his own unique and different ways depending on the animal.</a:t>
+            </a:r>
           </a:p>
         </p:txBody>
       </p:sp>
@@ -5897,10 +5853,40 @@
           </a:p>
         </p:txBody>
       </p:sp>
+      <p:pic>
+        <p:nvPicPr>
+          <p:cNvPr id="6" name="Picture 5"/>
+          <p:cNvPicPr>
+            <a:picLocks noChangeAspect="1"/>
+          </p:cNvPicPr>
+          <p:nvPr/>
+        </p:nvPicPr>
+        <p:blipFill>
+          <a:blip r:embed="rId2">
+            <a:extLst>
+              <a:ext uri="{28A0092B-C50C-407E-A947-70E740481C1C}">
+                <a14:useLocalDpi xmlns:a14="http://schemas.microsoft.com/office/drawing/2010/main" val="0"/>
+              </a:ext>
+            </a:extLst>
+          </a:blip>
+          <a:stretch>
+            <a:fillRect/>
+          </a:stretch>
+        </p:blipFill>
+        <p:spPr>
+          <a:xfrm>
+            <a:off x="7700211" y="1825625"/>
+            <a:ext cx="3653588" cy="4351338"/>
+          </a:xfrm>
+          <a:prstGeom prst="rect">
+            <a:avLst/>
+          </a:prstGeom>
+        </p:spPr>
+      </p:pic>
     </p:spTree>
     <p:extLst>
       <p:ext uri="{BB962C8B-B14F-4D97-AF65-F5344CB8AC3E}">
-        <p14:creationId xmlns:p14="http://schemas.microsoft.com/office/powerpoint/2010/main" val="1262960452"/>
+        <p14:creationId xmlns:p14="http://schemas.microsoft.com/office/powerpoint/2010/main" val="114648560"/>
       </p:ext>
     </p:extLst>
   </p:cSld>
@@ -5963,15 +5949,11 @@
             <a:pPr algn="ctr"/>
             <a:r>
               <a:rPr lang="en-US" dirty="0" smtClean="0"/>
-              <a:t>“throw”-</a:t>
+              <a:t>Benefits of </a:t>
             </a:r>
             <a:r>
               <a:rPr lang="en-US" dirty="0" err="1" smtClean="0"/>
-              <a:t>ing</a:t>
-            </a:r>
-            <a:r>
-              <a:rPr lang="en-US" dirty="0" smtClean="0"/>
-              <a:t> Exception</a:t>
+              <a:t>Polymorpohism</a:t>
             </a:r>
             <a:endParaRPr lang="en-US" dirty="0"/>
           </a:p>
@@ -6008,29 +5990,45 @@
             <a:endParaRPr lang="en-US" sz="2800" dirty="0" smtClean="0"/>
           </a:p>
           <a:p>
+            <a:endParaRPr lang="en-US" sz="2800" dirty="0"/>
+          </a:p>
+          <a:p>
             <a:r>
               <a:rPr lang="en-US" sz="2800" dirty="0" smtClean="0"/>
-              <a:t>A programmer also could “throw” an exception. If certain condition in the code that the programmer mandate to be fulfilled is violated and the programmer thinks that further execution is not possible then he can decide to throw an exception explicitly.</a:t>
-            </a:r>
-          </a:p>
-          <a:p>
+              <a:t>Promotes </a:t>
+            </a:r>
+            <a:r>
+              <a:rPr lang="en-US" sz="2800" dirty="0"/>
+              <a:t>substitutability</a:t>
+            </a:r>
             <a:r>
               <a:rPr lang="en-US" sz="2800" dirty="0" smtClean="0"/>
-              <a:t>Only exception objects can be used with “throw” clause not any other object. Hence following is an example of incorrect throw usage :</a:t>
+              <a:t>.</a:t>
             </a:r>
           </a:p>
           <a:p>
             <a:pPr lvl="1"/>
             <a:r>
               <a:rPr lang="en-US" sz="2600" dirty="0" smtClean="0"/>
-              <a:t>throw new String(“Java”)</a:t>
-            </a:r>
-          </a:p>
-          <a:p>
-            <a:r>
-              <a:rPr lang="en-US" sz="2800" dirty="0" smtClean="0"/>
-              <a:t>Only objects whose classes lie in the exception hierarchy are eligible to be used with “throw” clause.</a:t>
-            </a:r>
+              <a:t>Instead of using specific class names, we make use of generic parent class references. This reduces the overall code that needs to be written.</a:t>
+            </a:r>
+          </a:p>
+          <a:p>
+            <a:pPr lvl="1"/>
+            <a:r>
+              <a:rPr lang="en-US" sz="2400" dirty="0" smtClean="0"/>
+              <a:t>Whenever there arises a need for introducing a new type, then the existing code can take care of the new type as well since it is written in a generic way.</a:t>
+            </a:r>
+            <a:endParaRPr lang="en-US" sz="2800" dirty="0"/>
+          </a:p>
+          <a:p>
+            <a:pPr marL="0" indent="0">
+              <a:buNone/>
+            </a:pPr>
+            <a:endParaRPr lang="en-US" sz="2800" dirty="0" smtClean="0"/>
+          </a:p>
+          <a:p>
+            <a:endParaRPr lang="en-US" sz="2800" dirty="0" smtClean="0"/>
           </a:p>
         </p:txBody>
       </p:sp>
@@ -6197,7 +6195,7 @@
             <a:pPr algn="ctr"/>
             <a:r>
               <a:rPr lang="en-US" dirty="0" smtClean="0"/>
-              <a:t>Finally Block</a:t>
+              <a:t>Overriding</a:t>
             </a:r>
             <a:endParaRPr lang="en-US" dirty="0"/>
           </a:p>
@@ -6231,26 +6229,31 @@
           </a:bodyPr>
           <a:lstStyle/>
           <a:p>
-            <a:endParaRPr lang="en-US" sz="2800" dirty="0" smtClean="0"/>
-          </a:p>
-          <a:p>
             <a:r>
               <a:rPr lang="en-US" sz="2800" dirty="0" smtClean="0"/>
-              <a:t>A finally block is sure piece of code. This means that whether and exception occurs or not , the code in finally block is guaranteed to be executed.</a:t>
-            </a:r>
-          </a:p>
-          <a:p>
+              <a:t>Inheritance provides </a:t>
+            </a:r>
             <a:r>
               <a:rPr lang="en-US" sz="2800" dirty="0" smtClean="0"/>
-              <a:t>This is  a common place to close any open database connection or file streams or other common tasks like setting objects to null, </a:t>
-            </a:r>
-            <a:r>
-              <a:rPr lang="en-US" sz="2800" dirty="0" err="1" smtClean="0"/>
-              <a:t>rsetting</a:t>
-            </a:r>
-            <a:r>
-              <a:rPr lang="en-US" sz="2800" dirty="0" smtClean="0"/>
-              <a:t> any value etc. This block ideally contains code that is used for cleaning up affairs.</a:t>
+              <a:t>us the luxury of using things from our parents, its like getting the to the hidden reassure of riches from my father. I can use it with no additional efforts.</a:t>
+            </a:r>
+          </a:p>
+          <a:p>
+            <a:r>
+              <a:rPr lang="en-US" sz="2800" noProof="1" smtClean="0"/>
+              <a:t>On the other hand, it may be sometimes necessary that things inherited from our parents/ancestors be changed or modified to make them better or to make them into something that is more useful for us or more accustomed to what we need.</a:t>
+            </a:r>
+          </a:p>
+          <a:p>
+            <a:r>
+              <a:rPr lang="en-US" sz="2800" noProof="1" smtClean="0"/>
+              <a:t>This is where we get to know the phenomenon of overriding.</a:t>
+            </a:r>
+          </a:p>
+          <a:p>
+            <a:r>
+              <a:rPr lang="en-US" sz="2800" noProof="1" smtClean="0"/>
+              <a:t>Imagine getting an old car from your father , Yuck !! Who drives it today. You need something which looks more trendy.</a:t>
             </a:r>
           </a:p>
         </p:txBody>
@@ -6355,7 +6358,7 @@
     </p:spTree>
     <p:extLst>
       <p:ext uri="{BB962C8B-B14F-4D97-AF65-F5344CB8AC3E}">
-        <p14:creationId xmlns:p14="http://schemas.microsoft.com/office/powerpoint/2010/main" val="2146720335"/>
+        <p14:creationId xmlns:p14="http://schemas.microsoft.com/office/powerpoint/2010/main" val="859118885"/>
       </p:ext>
     </p:extLst>
   </p:cSld>
@@ -6418,7 +6421,7 @@
             <a:pPr algn="ctr"/>
             <a:r>
               <a:rPr lang="en-US" dirty="0" smtClean="0"/>
-              <a:t>Try-Catch-Finally mechanism</a:t>
+              <a:t>Overriding My father’s Old Car</a:t>
             </a:r>
             <a:endParaRPr lang="en-US" dirty="0"/>
           </a:p>
@@ -6523,7 +6526,7 @@
       </p:sp>
       <p:pic>
         <p:nvPicPr>
-          <p:cNvPr id="8" name="Content Placeholder 7"/>
+          <p:cNvPr id="5" name="Content Placeholder 4"/>
           <p:cNvPicPr>
             <a:picLocks noGrp="1" noChangeAspect="1"/>
           </p:cNvPicPr>
@@ -6545,9 +6548,111 @@
         </p:blipFill>
         <p:spPr>
           <a:xfrm>
-            <a:off x="2298248" y="1827704"/>
-            <a:ext cx="6596371" cy="4351338"/>
-          </a:xfrm>
+            <a:off x="838199" y="1890208"/>
+            <a:ext cx="3983183" cy="3594100"/>
+          </a:xfrm>
+        </p:spPr>
+      </p:pic>
+      <p:pic>
+        <p:nvPicPr>
+          <p:cNvPr id="6" name="Picture 5"/>
+          <p:cNvPicPr>
+            <a:picLocks noChangeAspect="1"/>
+          </p:cNvPicPr>
+          <p:nvPr/>
+        </p:nvPicPr>
+        <p:blipFill>
+          <a:blip r:embed="rId3" cstate="hqprint">
+            <a:extLst>
+              <a:ext uri="{28A0092B-C50C-407E-A947-70E740481C1C}">
+                <a14:useLocalDpi xmlns:a14="http://schemas.microsoft.com/office/drawing/2010/main" val="0"/>
+              </a:ext>
+            </a:extLst>
+          </a:blip>
+          <a:stretch>
+            <a:fillRect/>
+          </a:stretch>
+        </p:blipFill>
+        <p:spPr>
+          <a:xfrm>
+            <a:off x="7342909" y="1890208"/>
+            <a:ext cx="3808018" cy="3594100"/>
+          </a:xfrm>
+          <a:prstGeom prst="rect">
+            <a:avLst/>
+          </a:prstGeom>
+        </p:spPr>
+      </p:pic>
+      <p:pic>
+        <p:nvPicPr>
+          <p:cNvPr id="9" name="Picture 8"/>
+          <p:cNvPicPr>
+            <a:picLocks noChangeAspect="1"/>
+          </p:cNvPicPr>
+          <p:nvPr/>
+        </p:nvPicPr>
+        <p:blipFill>
+          <a:blip r:embed="rId4"/>
+          <a:stretch>
+            <a:fillRect/>
+          </a:stretch>
+        </p:blipFill>
+        <p:spPr>
+          <a:xfrm>
+            <a:off x="1062182" y="5595793"/>
+            <a:ext cx="3546764" cy="574098"/>
+          </a:xfrm>
+          <a:prstGeom prst="rect">
+            <a:avLst/>
+          </a:prstGeom>
+        </p:spPr>
+      </p:pic>
+      <p:pic>
+        <p:nvPicPr>
+          <p:cNvPr id="10" name="Picture 9"/>
+          <p:cNvPicPr>
+            <a:picLocks noChangeAspect="1"/>
+          </p:cNvPicPr>
+          <p:nvPr/>
+        </p:nvPicPr>
+        <p:blipFill>
+          <a:blip r:embed="rId5"/>
+          <a:stretch>
+            <a:fillRect/>
+          </a:stretch>
+        </p:blipFill>
+        <p:spPr>
+          <a:xfrm>
+            <a:off x="7521902" y="5597416"/>
+            <a:ext cx="3629025" cy="572475"/>
+          </a:xfrm>
+          <a:prstGeom prst="rect">
+            <a:avLst/>
+          </a:prstGeom>
+        </p:spPr>
+      </p:pic>
+      <p:pic>
+        <p:nvPicPr>
+          <p:cNvPr id="12" name="Picture 11"/>
+          <p:cNvPicPr>
+            <a:picLocks noChangeAspect="1"/>
+          </p:cNvPicPr>
+          <p:nvPr/>
+        </p:nvPicPr>
+        <p:blipFill>
+          <a:blip r:embed="rId6"/>
+          <a:stretch>
+            <a:fillRect/>
+          </a:stretch>
+        </p:blipFill>
+        <p:spPr>
+          <a:xfrm>
+            <a:off x="4821382" y="3214687"/>
+            <a:ext cx="2410691" cy="428625"/>
+          </a:xfrm>
+          <a:prstGeom prst="rect">
+            <a:avLst/>
+          </a:prstGeom>
         </p:spPr>
       </p:pic>
     </p:spTree>
@@ -6615,9 +6720,10 @@
           <a:p>
             <a:pPr algn="ctr"/>
             <a:r>
-              <a:rPr lang="en-US" dirty="0"/>
-              <a:t>Checked &amp; Unchecked Exceptions</a:t>
-            </a:r>
+              <a:rPr lang="en-US" dirty="0" smtClean="0"/>
+              <a:t>Overriding….</a:t>
+            </a:r>
+            <a:endParaRPr lang="en-US" dirty="0"/>
           </a:p>
         </p:txBody>
       </p:sp>
@@ -6649,73 +6755,26 @@
           </a:bodyPr>
           <a:lstStyle/>
           <a:p>
-            <a:r>
-              <a:rPr lang="en-US" dirty="0" smtClean="0"/>
-              <a:t>There are two types of exceptions in java </a:t>
+            <a:endParaRPr lang="en-US" sz="2800" dirty="0" smtClean="0"/>
+          </a:p>
+          <a:p>
+            <a:endParaRPr lang="en-US" sz="2800" dirty="0"/>
+          </a:p>
+          <a:p>
+            <a:r>
+              <a:rPr lang="en-US" sz="2800" dirty="0" smtClean="0"/>
+              <a:t>Overriding only applies to behavioral aspect of the class. This means the subclass can override only the method of the parent class.</a:t>
+            </a:r>
+          </a:p>
+          <a:p>
+            <a:r>
+              <a:rPr lang="en-US" sz="2800" dirty="0" smtClean="0"/>
+              <a:t>In order to transparently override the method from the parent class, it is important to follow certain rules of overriding.</a:t>
             </a:r>
           </a:p>
           <a:p>
             <a:pPr lvl="1"/>
-            <a:r>
-              <a:rPr lang="en-US" sz="2000" dirty="0" smtClean="0"/>
-              <a:t>Unchecked.</a:t>
-            </a:r>
-          </a:p>
-          <a:p>
-            <a:pPr lvl="2"/>
-            <a:r>
-              <a:rPr lang="en-US" sz="2000" dirty="0" smtClean="0"/>
-              <a:t>Are those which are raised due to programming errors or situations which are irrecoverable. The compiler does not force the programmer to handle such sort of exceptions and it is upon programmers discretion to handle them or leave them.</a:t>
-            </a:r>
-          </a:p>
-          <a:p>
-            <a:pPr lvl="2"/>
-            <a:r>
-              <a:rPr lang="en-US" sz="2000" dirty="0" smtClean="0"/>
-              <a:t>All exception classes inheriting from </a:t>
-            </a:r>
-            <a:r>
-              <a:rPr lang="en-US" sz="2000" b="1" i="1" u="sng" dirty="0" smtClean="0"/>
-              <a:t>Error &amp; </a:t>
-            </a:r>
-            <a:r>
-              <a:rPr lang="en-US" sz="2000" b="1" i="1" u="sng" dirty="0" err="1" smtClean="0"/>
-              <a:t>RuntimeException</a:t>
-            </a:r>
-            <a:r>
-              <a:rPr lang="en-US" sz="2000" dirty="0" smtClean="0"/>
-              <a:t> are examples of unchecked exceptions.</a:t>
-            </a:r>
-          </a:p>
-          <a:p>
-            <a:pPr lvl="1"/>
-            <a:r>
-              <a:rPr lang="en-US" sz="2000" dirty="0" smtClean="0"/>
-              <a:t>Checked</a:t>
-            </a:r>
-          </a:p>
-          <a:p>
-            <a:pPr lvl="2"/>
-            <a:r>
-              <a:rPr lang="en-US" sz="2000" dirty="0" smtClean="0"/>
-              <a:t>Those exception which compiler forces the programmer to mandatorily handle.</a:t>
-            </a:r>
-          </a:p>
-          <a:p>
-            <a:pPr lvl="2"/>
-            <a:r>
-              <a:rPr lang="en-US" sz="2000" noProof="1" smtClean="0"/>
-              <a:t>All exception classes extending from </a:t>
-            </a:r>
-            <a:r>
-              <a:rPr lang="en-US" sz="2000" b="1" i="1" u="sng" noProof="1" smtClean="0"/>
-              <a:t>Exception</a:t>
-            </a:r>
-            <a:r>
-              <a:rPr lang="en-US" sz="2000" noProof="1" smtClean="0"/>
-              <a:t> class or any subclass except that of RuntimeException.</a:t>
-            </a:r>
-            <a:endParaRPr lang="en-US" sz="2000" noProof="1"/>
+            <a:endParaRPr lang="en-US" sz="2600" dirty="0" smtClean="0"/>
           </a:p>
         </p:txBody>
       </p:sp>
@@ -6819,7 +6878,7 @@
     </p:spTree>
     <p:extLst>
       <p:ext uri="{BB962C8B-B14F-4D97-AF65-F5344CB8AC3E}">
-        <p14:creationId xmlns:p14="http://schemas.microsoft.com/office/powerpoint/2010/main" val="859118885"/>
+        <p14:creationId xmlns:p14="http://schemas.microsoft.com/office/powerpoint/2010/main" val="3440705767"/>
       </p:ext>
     </p:extLst>
   </p:cSld>
@@ -6882,7 +6941,7 @@
             <a:pPr algn="ctr"/>
             <a:r>
               <a:rPr lang="en-US" dirty="0" smtClean="0"/>
-              <a:t>Handling Multiple Exceptions</a:t>
+              <a:t>Rules of Overriding</a:t>
             </a:r>
             <a:endParaRPr lang="en-US" dirty="0"/>
           </a:p>
@@ -6912,31 +6971,156 @@
         </p:spPr>
         <p:txBody>
           <a:bodyPr>
-            <a:normAutofit/>
+            <a:normAutofit fontScale="55000" lnSpcReduction="20000"/>
           </a:bodyPr>
           <a:lstStyle/>
           <a:p>
+            <a:r>
+              <a:rPr lang="en-US" sz="2800" dirty="0"/>
+              <a:t>In order to override a method from parent class, the child class must ensure following rules : </a:t>
+            </a:r>
             <a:endParaRPr lang="en-US" sz="2800" dirty="0" smtClean="0"/>
           </a:p>
           <a:p>
-            <a:r>
-              <a:rPr lang="en-US" sz="2800" dirty="0" smtClean="0"/>
-              <a:t>A finally block is sure piece of code. This means that whether and exception occurs or not , the code in finally block is guaranteed to be executed.</a:t>
-            </a:r>
-          </a:p>
-          <a:p>
-            <a:r>
-              <a:rPr lang="en-US" sz="2800" dirty="0" smtClean="0"/>
-              <a:t>This is  a common place to close any open database connection or file streams or other common tasks like setting objects to null, </a:t>
-            </a:r>
-            <a:r>
-              <a:rPr lang="en-US" sz="2800" dirty="0" err="1" smtClean="0"/>
-              <a:t>rsetting</a:t>
-            </a:r>
-            <a:r>
-              <a:rPr lang="en-US" sz="2800" dirty="0" smtClean="0"/>
-              <a:t> any value etc. This block ideally contains code that is used for cleaning up affairs.</a:t>
-            </a:r>
+            <a:pPr lvl="1"/>
+            <a:r>
+              <a:rPr lang="en-US" sz="2600" dirty="0" smtClean="0"/>
+              <a:t>Name</a:t>
+            </a:r>
+          </a:p>
+          <a:p>
+            <a:pPr lvl="2"/>
+            <a:r>
+              <a:rPr lang="en-US" sz="2400" dirty="0" smtClean="0"/>
+              <a:t>Name of the method must be the same as that of the parent class.</a:t>
+            </a:r>
+          </a:p>
+          <a:p>
+            <a:pPr lvl="1"/>
+            <a:r>
+              <a:rPr lang="en-US" sz="2600" dirty="0" smtClean="0"/>
+              <a:t>Accessibility</a:t>
+            </a:r>
+          </a:p>
+          <a:p>
+            <a:pPr lvl="2"/>
+            <a:r>
+              <a:rPr lang="en-US" sz="2400" dirty="0"/>
+              <a:t>O</a:t>
+            </a:r>
+            <a:r>
+              <a:rPr lang="en-US" sz="2400" dirty="0" smtClean="0"/>
+              <a:t>verriding method can increase the accessibility of the method. This means that if a method is declared as protected in the parent class then the subclass can declare it as public.</a:t>
+            </a:r>
+          </a:p>
+          <a:p>
+            <a:pPr lvl="1"/>
+            <a:r>
+              <a:rPr lang="en-US" sz="2600" dirty="0" smtClean="0"/>
+              <a:t>Return Type</a:t>
+            </a:r>
+          </a:p>
+          <a:p>
+            <a:pPr lvl="2"/>
+            <a:r>
+              <a:rPr lang="en-US" sz="2400" dirty="0" smtClean="0"/>
+              <a:t>Overriding method can declare the same return type as that of the parent or can declare a return type which is a subtype of the return type of parent. </a:t>
+            </a:r>
+          </a:p>
+          <a:p>
+            <a:pPr lvl="2"/>
+            <a:r>
+              <a:rPr lang="en-US" sz="2400" dirty="0" smtClean="0"/>
+              <a:t>For ex. if the parent overridden method declares return type as Object then the overriding method in the subclass can declare return type as Object or a subclass of Object like String, Integer etc. </a:t>
+            </a:r>
+          </a:p>
+          <a:p>
+            <a:pPr lvl="2"/>
+            <a:r>
+              <a:rPr lang="en-US" sz="2400" dirty="0" smtClean="0"/>
+              <a:t>In case of primitive types the return type should match exactly.</a:t>
+            </a:r>
+          </a:p>
+          <a:p>
+            <a:pPr lvl="1"/>
+            <a:r>
+              <a:rPr lang="en-US" sz="2600" dirty="0" smtClean="0"/>
+              <a:t>Parameters</a:t>
+            </a:r>
+          </a:p>
+          <a:p>
+            <a:pPr lvl="2"/>
+            <a:r>
+              <a:rPr lang="en-US" sz="2400" dirty="0" smtClean="0"/>
+              <a:t>The number &amp;  type of parameters should be exactly the same along with its order.</a:t>
+            </a:r>
+          </a:p>
+          <a:p>
+            <a:pPr lvl="1"/>
+            <a:r>
+              <a:rPr lang="en-US" sz="2600" dirty="0" smtClean="0"/>
+              <a:t>Throws Clause</a:t>
+            </a:r>
+          </a:p>
+          <a:p>
+            <a:pPr lvl="2"/>
+            <a:r>
+              <a:rPr lang="en-US" sz="2400" dirty="0" smtClean="0"/>
+              <a:t>Overriding method can declare exception which are same or subtype of the exception declared in the parent class overriding method.</a:t>
+            </a:r>
+          </a:p>
+          <a:p>
+            <a:pPr lvl="2"/>
+            <a:r>
+              <a:rPr lang="en-US" sz="2400" dirty="0" smtClean="0"/>
+              <a:t>Any number </a:t>
+            </a:r>
+            <a:r>
+              <a:rPr lang="en-US" sz="2400" dirty="0"/>
+              <a:t>of exceptions </a:t>
+            </a:r>
+            <a:r>
+              <a:rPr lang="en-US" sz="2400" dirty="0" smtClean="0"/>
+              <a:t>can be declared in </a:t>
+            </a:r>
+            <a:r>
+              <a:rPr lang="en-US" sz="2400" dirty="0"/>
+              <a:t>the overridden method </a:t>
+            </a:r>
+            <a:r>
+              <a:rPr lang="en-US" sz="2400" dirty="0" smtClean="0"/>
+              <a:t>provided they are all subtype of the exception type declared in the parent class overriding method.</a:t>
+            </a:r>
+          </a:p>
+          <a:p>
+            <a:pPr lvl="2"/>
+            <a:r>
+              <a:rPr lang="en-US" sz="2400" dirty="0" smtClean="0"/>
+              <a:t>An overriding class cannot declare exception not listed in the throws clause of parent class overridden method.</a:t>
+            </a:r>
+          </a:p>
+          <a:p>
+            <a:pPr lvl="2"/>
+            <a:r>
+              <a:rPr lang="en-US" sz="2400" dirty="0" smtClean="0"/>
+              <a:t>Overriding method can choose to altogether skip the throws clause.</a:t>
+            </a:r>
+          </a:p>
+          <a:p>
+            <a:pPr lvl="2"/>
+            <a:r>
+              <a:rPr lang="en-US" sz="2400" dirty="0" smtClean="0"/>
+              <a:t>All rules relating to exceptions apply only to checked exceptions. They are no rules for unchecked exceptions.</a:t>
+            </a:r>
+            <a:endParaRPr lang="en-US" sz="2400" dirty="0"/>
+          </a:p>
+          <a:p>
+            <a:pPr lvl="2"/>
+            <a:endParaRPr lang="en-US" sz="2400" dirty="0"/>
+          </a:p>
+          <a:p>
+            <a:pPr lvl="1"/>
+            <a:endParaRPr lang="en-US" sz="2600" dirty="0"/>
           </a:p>
         </p:txBody>
       </p:sp>
@@ -7414,8 +7598,8 @@
         </p:nvSpPr>
         <p:spPr>
           <a:xfrm>
-            <a:off x="838199" y="641857"/>
-            <a:ext cx="10515600" cy="772107"/>
+            <a:off x="838199" y="611079"/>
+            <a:ext cx="10515600" cy="833663"/>
           </a:xfrm>
         </p:spPr>
         <p:txBody>
@@ -7424,10 +7608,10 @@
           <a:p>
             <a:pPr algn="ctr"/>
             <a:r>
-              <a:rPr lang="en-US" sz="3600" dirty="0" smtClean="0"/>
-              <a:t>Exceptions in Static Initializers</a:t>
-            </a:r>
-            <a:endParaRPr lang="en-US" sz="3600" dirty="0"/>
+              <a:rPr lang="en-US" dirty="0" smtClean="0"/>
+              <a:t>The “final” class</a:t>
+            </a:r>
+            <a:endParaRPr lang="en-US" dirty="0"/>
           </a:p>
         </p:txBody>
       </p:sp>
@@ -7450,47 +7634,56 @@
         <p:spPr>
           <a:xfrm>
             <a:off x="838199" y="1825625"/>
-            <a:ext cx="10515599" cy="4351338"/>
+            <a:ext cx="5969001" cy="4351338"/>
           </a:xfrm>
         </p:spPr>
         <p:txBody>
           <a:bodyPr>
-            <a:normAutofit/>
+            <a:normAutofit fontScale="92500" lnSpcReduction="10000"/>
           </a:bodyPr>
           <a:lstStyle/>
           <a:p>
-            <a:endParaRPr lang="en-US" sz="2800" dirty="0" smtClean="0"/>
-          </a:p>
-          <a:p>
-            <a:r>
-              <a:rPr lang="en-US" sz="2800" dirty="0" smtClean="0"/>
-              <a:t>Static Initializers are the piece of code that are called when the class is loaded by the JVM for the first time.</a:t>
-            </a:r>
-          </a:p>
-          <a:p>
-            <a:r>
-              <a:rPr lang="en-US" sz="2800" dirty="0" smtClean="0"/>
-              <a:t>There is no application code that directly invokes it.</a:t>
-            </a:r>
-          </a:p>
-          <a:p>
-            <a:r>
-              <a:rPr lang="en-US" sz="2800" dirty="0" smtClean="0"/>
-              <a:t>As a result following applies to static initializers : </a:t>
-            </a:r>
-          </a:p>
-          <a:p>
-            <a:pPr lvl="1"/>
-            <a:r>
-              <a:rPr lang="en-US" sz="2600" dirty="0" smtClean="0"/>
-              <a:t>No unchecked exceptions are allowed to be thrown from within the static initializer block.</a:t>
-            </a:r>
-          </a:p>
-          <a:p>
-            <a:pPr lvl="1"/>
-            <a:r>
-              <a:rPr lang="en-US" sz="2600" dirty="0" smtClean="0"/>
-              <a:t>Checked exceptions must be handled within the body of the static initializer block and are not allowed to be propagated further.</a:t>
+            <a:r>
+              <a:rPr lang="en-US" dirty="0"/>
+              <a:t>Limited edition cars are a special form of art, </a:t>
+            </a:r>
+            <a:r>
+              <a:rPr lang="en-US" dirty="0" smtClean="0"/>
+              <a:t>style </a:t>
+            </a:r>
+            <a:r>
+              <a:rPr lang="en-US" dirty="0"/>
+              <a:t>and performance of a </a:t>
+            </a:r>
+            <a:r>
+              <a:rPr lang="en-US" dirty="0" smtClean="0"/>
+              <a:t>model. </a:t>
+            </a:r>
+            <a:r>
+              <a:rPr lang="en-US" dirty="0"/>
+              <a:t>Limited production cars are usually reserved for a special occasion, maybe an </a:t>
+            </a:r>
+            <a:r>
+              <a:rPr lang="en-US" dirty="0" smtClean="0"/>
+              <a:t>anniversary. They are a one time make and no new cars extending the features of the limited edition car comes out.</a:t>
+            </a:r>
+          </a:p>
+          <a:p>
+            <a:r>
+              <a:rPr lang="en-US" dirty="0" smtClean="0"/>
+              <a:t>Similarly we can make a class that cannot be inherited further. This can be achieved by declaring a class as final.</a:t>
+            </a:r>
+          </a:p>
+          <a:p>
+            <a:r>
+              <a:rPr lang="en-US" dirty="0" smtClean="0"/>
+              <a:t>Generally special purpose classes which have functionality that can be broken by inheriting them are declared as final.</a:t>
+            </a:r>
+          </a:p>
+          <a:p>
+            <a:r>
+              <a:rPr lang="en-US" dirty="0" smtClean="0"/>
+              <a:t>Good example of this is String class. Strings in java are immutable, and if allowed to be inherited then any class can implement them and change the internal functionality.</a:t>
             </a:r>
           </a:p>
         </p:txBody>
@@ -7592,10 +7785,40 @@
           </a:p>
         </p:txBody>
       </p:sp>
+      <p:pic>
+        <p:nvPicPr>
+          <p:cNvPr id="5" name="Picture 4"/>
+          <p:cNvPicPr>
+            <a:picLocks noChangeAspect="1"/>
+          </p:cNvPicPr>
+          <p:nvPr/>
+        </p:nvPicPr>
+        <p:blipFill>
+          <a:blip r:embed="rId2">
+            <a:extLst>
+              <a:ext uri="{28A0092B-C50C-407E-A947-70E740481C1C}">
+                <a14:useLocalDpi xmlns:a14="http://schemas.microsoft.com/office/drawing/2010/main" val="0"/>
+              </a:ext>
+            </a:extLst>
+          </a:blip>
+          <a:stretch>
+            <a:fillRect/>
+          </a:stretch>
+        </p:blipFill>
+        <p:spPr>
+          <a:xfrm>
+            <a:off x="7204364" y="1754969"/>
+            <a:ext cx="4149435" cy="4421994"/>
+          </a:xfrm>
+          <a:prstGeom prst="rect">
+            <a:avLst/>
+          </a:prstGeom>
+        </p:spPr>
+      </p:pic>
     </p:spTree>
     <p:extLst>
       <p:ext uri="{BB962C8B-B14F-4D97-AF65-F5344CB8AC3E}">
-        <p14:creationId xmlns:p14="http://schemas.microsoft.com/office/powerpoint/2010/main" val="2291679552"/>
+        <p14:creationId xmlns:p14="http://schemas.microsoft.com/office/powerpoint/2010/main" val="3546705181"/>
       </p:ext>
     </p:extLst>
   </p:cSld>
@@ -7647,8 +7870,8 @@
         </p:nvSpPr>
         <p:spPr>
           <a:xfrm>
-            <a:off x="838199" y="641857"/>
-            <a:ext cx="10515600" cy="772107"/>
+            <a:off x="838199" y="611079"/>
+            <a:ext cx="10515600" cy="833663"/>
           </a:xfrm>
         </p:spPr>
         <p:txBody>
@@ -7657,10 +7880,10 @@
           <a:p>
             <a:pPr algn="ctr"/>
             <a:r>
-              <a:rPr lang="en-US" sz="3600" dirty="0" smtClean="0"/>
-              <a:t>Exceptions in Initializers</a:t>
-            </a:r>
-            <a:endParaRPr lang="en-US" sz="3600" dirty="0"/>
+              <a:rPr lang="en-US" dirty="0" smtClean="0"/>
+              <a:t>The “final” method</a:t>
+            </a:r>
+            <a:endParaRPr lang="en-US" dirty="0"/>
           </a:p>
         </p:txBody>
       </p:sp>
@@ -7683,55 +7906,51 @@
         <p:spPr>
           <a:xfrm>
             <a:off x="838199" y="1825625"/>
-            <a:ext cx="10515599" cy="4351338"/>
+            <a:ext cx="5969001" cy="4351338"/>
           </a:xfrm>
         </p:spPr>
         <p:txBody>
           <a:bodyPr>
-            <a:normAutofit fontScale="92500" lnSpcReduction="10000"/>
+            <a:normAutofit/>
           </a:bodyPr>
           <a:lstStyle/>
           <a:p>
             <a:r>
-              <a:rPr lang="en-US" sz="2800" dirty="0" smtClean="0"/>
-              <a:t>Static Initializers are the piece of code that are called when the class is loaded by the JVM for the first time.</a:t>
-            </a:r>
-          </a:p>
-          <a:p>
-            <a:r>
-              <a:rPr lang="en-US" sz="2800" dirty="0" smtClean="0"/>
-              <a:t>There is no application code that directly invokes it.</a:t>
-            </a:r>
-          </a:p>
-          <a:p>
-            <a:r>
-              <a:rPr lang="en-US" sz="2800" dirty="0" smtClean="0"/>
-              <a:t>As a result following applies to static initializers : </a:t>
-            </a:r>
-          </a:p>
-          <a:p>
-            <a:pPr lvl="1"/>
-            <a:r>
-              <a:rPr lang="en-US" sz="2600" dirty="0" smtClean="0"/>
-              <a:t>No unchecked exceptions are allowed to be thrown from within the static initializer block.</a:t>
-            </a:r>
-          </a:p>
-          <a:p>
-            <a:pPr lvl="1"/>
-            <a:r>
-              <a:rPr lang="en-US" sz="2600" dirty="0" smtClean="0"/>
-              <a:t>Checked exceptions must be handled within the body of the static initializer block and are not allowed to be propagated further.</a:t>
-            </a:r>
-          </a:p>
-          <a:p>
-            <a:r>
-              <a:rPr lang="en-US" sz="2800" dirty="0" smtClean="0"/>
-              <a:t>In case of Instance initializer, programmer does have a way to handle the exceptions via the constructors. Hence the instance initializer can throw checked exceptions provided the constructor provides a throws clause listing the same exception there.</a:t>
-            </a:r>
-            <a:endParaRPr lang="en-US" sz="2800" dirty="0"/>
-          </a:p>
-          <a:p>
-            <a:endParaRPr lang="en-US" sz="2800" dirty="0" smtClean="0"/>
+              <a:rPr lang="en-US" dirty="0" smtClean="0"/>
+              <a:t>We all have heard about the popularity of open source. One of the main reasons behind its popularity is that anyone can download the code and do changes to it and create something new out of the existing piece of software.</a:t>
+            </a:r>
+          </a:p>
+          <a:p>
+            <a:r>
+              <a:rPr lang="en-US" dirty="0" smtClean="0"/>
+              <a:t>Being freely available and open for modification makes it all the more cool.</a:t>
+            </a:r>
+          </a:p>
+          <a:p>
+            <a:r>
+              <a:rPr lang="en-US" dirty="0" smtClean="0"/>
+              <a:t>On the other hand we also know about licensed </a:t>
+            </a:r>
+            <a:r>
+              <a:rPr lang="en-US" dirty="0" err="1" smtClean="0"/>
+              <a:t>softwares</a:t>
+            </a:r>
+            <a:r>
+              <a:rPr lang="en-US" dirty="0" smtClean="0"/>
+              <a:t> like MS power point or Adobe photo shop.</a:t>
+            </a:r>
+          </a:p>
+          <a:p>
+            <a:r>
+              <a:rPr lang="en-US" dirty="0" smtClean="0"/>
+              <a:t>These are proprietary software and can only be used and provide no way of extending their functionality.</a:t>
+            </a:r>
+          </a:p>
+          <a:p>
+            <a:r>
+              <a:rPr lang="en-US" dirty="0" smtClean="0"/>
+              <a:t>This makes a perfect example for </a:t>
+            </a:r>
           </a:p>
         </p:txBody>
       </p:sp>
@@ -7832,10 +8051,40 @@
           </a:p>
         </p:txBody>
       </p:sp>
+      <p:pic>
+        <p:nvPicPr>
+          <p:cNvPr id="6" name="Picture 5"/>
+          <p:cNvPicPr>
+            <a:picLocks noChangeAspect="1"/>
+          </p:cNvPicPr>
+          <p:nvPr/>
+        </p:nvPicPr>
+        <p:blipFill>
+          <a:blip r:embed="rId2">
+            <a:extLst>
+              <a:ext uri="{28A0092B-C50C-407E-A947-70E740481C1C}">
+                <a14:useLocalDpi xmlns:a14="http://schemas.microsoft.com/office/drawing/2010/main" val="0"/>
+              </a:ext>
+            </a:extLst>
+          </a:blip>
+          <a:stretch>
+            <a:fillRect/>
+          </a:stretch>
+        </p:blipFill>
+        <p:spPr>
+          <a:xfrm>
+            <a:off x="6807199" y="1825625"/>
+            <a:ext cx="4546599" cy="4351338"/>
+          </a:xfrm>
+          <a:prstGeom prst="rect">
+            <a:avLst/>
+          </a:prstGeom>
+        </p:spPr>
+      </p:pic>
     </p:spTree>
     <p:extLst>
       <p:ext uri="{BB962C8B-B14F-4D97-AF65-F5344CB8AC3E}">
-        <p14:creationId xmlns:p14="http://schemas.microsoft.com/office/powerpoint/2010/main" val="3057752647"/>
+        <p14:creationId xmlns:p14="http://schemas.microsoft.com/office/powerpoint/2010/main" val="3079201952"/>
       </p:ext>
     </p:extLst>
   </p:cSld>
@@ -7898,7 +8147,7 @@
             <a:pPr algn="ctr"/>
             <a:r>
               <a:rPr lang="en-US" sz="3600" dirty="0" smtClean="0"/>
-              <a:t>Other Points</a:t>
+              <a:t>The “final” methods</a:t>
             </a:r>
             <a:endParaRPr lang="en-US" sz="3600" dirty="0"/>
           </a:p>
@@ -7922,51 +8171,20 @@
         </p:nvSpPr>
         <p:spPr>
           <a:xfrm>
-            <a:off x="838199" y="1825625"/>
-            <a:ext cx="10515599" cy="4351338"/>
+            <a:off x="838199" y="1625600"/>
+            <a:ext cx="10515599" cy="4551363"/>
           </a:xfrm>
         </p:spPr>
         <p:txBody>
           <a:bodyPr>
-            <a:normAutofit fontScale="92500"/>
+            <a:normAutofit/>
           </a:bodyPr>
           <a:lstStyle/>
           <a:p>
             <a:r>
               <a:rPr lang="en-US" sz="2800" dirty="0" smtClean="0"/>
-              <a:t>Exceptions in a constructor are no different than any other method except for one case which is in the case of super-sub class relationship.</a:t>
-            </a:r>
-          </a:p>
-          <a:p>
-            <a:r>
-              <a:rPr lang="en-US" sz="2800" dirty="0" smtClean="0"/>
-              <a:t>If the super class constructor declares an exception in the throws clause then the subclass must also declare in its throws clause an exception of same class or higher.</a:t>
-            </a:r>
-          </a:p>
-          <a:p>
-            <a:r>
-              <a:rPr lang="en-US" sz="2800" dirty="0" smtClean="0"/>
-              <a:t>Normally we should handle all the exceptions and do something in  catch block to recover from it like log the exception or print the tack trace.</a:t>
-            </a:r>
-          </a:p>
-          <a:p>
-            <a:r>
-              <a:rPr lang="en-US" sz="2800" dirty="0" smtClean="0"/>
-              <a:t>Try block can be nested within another try block.</a:t>
-            </a:r>
-          </a:p>
-          <a:p>
-            <a:r>
-              <a:rPr lang="en-US" sz="2800" dirty="0" smtClean="0"/>
-              <a:t>Exception can also be thrown from a catch or </a:t>
-            </a:r>
-            <a:r>
-              <a:rPr lang="en-US" sz="2800" smtClean="0"/>
-              <a:t>finally block.</a:t>
-            </a:r>
-            <a:endParaRPr lang="en-US" sz="2800" dirty="0" smtClean="0"/>
-          </a:p>
-          <a:p>
+              <a:t>Open source code is something ever</a:t>
+            </a:r>
             <a:endParaRPr lang="en-US" sz="2800" dirty="0" smtClean="0"/>
           </a:p>
         </p:txBody>
@@ -8071,7 +8289,7 @@
     </p:spTree>
     <p:extLst>
       <p:ext uri="{BB962C8B-B14F-4D97-AF65-F5344CB8AC3E}">
-        <p14:creationId xmlns:p14="http://schemas.microsoft.com/office/powerpoint/2010/main" val="2549937363"/>
+        <p14:creationId xmlns:p14="http://schemas.microsoft.com/office/powerpoint/2010/main" val="3057752647"/>
       </p:ext>
     </p:extLst>
   </p:cSld>
@@ -8123,8 +8341,8 @@
         </p:nvSpPr>
         <p:spPr>
           <a:xfrm>
-            <a:off x="838199" y="611079"/>
-            <a:ext cx="10515600" cy="833663"/>
+            <a:off x="838199" y="641857"/>
+            <a:ext cx="10515600" cy="772107"/>
           </a:xfrm>
         </p:spPr>
         <p:txBody>
@@ -8133,10 +8351,10 @@
           <a:p>
             <a:pPr algn="ctr"/>
             <a:r>
-              <a:rPr lang="en-US" dirty="0" smtClean="0"/>
-              <a:t>Checked &amp; Unchecked Exceptions</a:t>
-            </a:r>
-            <a:endParaRPr lang="en-US" dirty="0"/>
+              <a:rPr lang="en-US" sz="3600" dirty="0" smtClean="0"/>
+              <a:t>Other Points</a:t>
+            </a:r>
+            <a:endParaRPr lang="en-US" sz="3600" dirty="0"/>
           </a:p>
         </p:txBody>
       </p:sp>
@@ -8159,40 +8377,51 @@
         <p:spPr>
           <a:xfrm>
             <a:off x="838199" y="1825625"/>
-            <a:ext cx="6689437" cy="4351338"/>
+            <a:ext cx="10515599" cy="4351338"/>
           </a:xfrm>
         </p:spPr>
         <p:txBody>
           <a:bodyPr>
-            <a:normAutofit/>
+            <a:normAutofit fontScale="92500"/>
           </a:bodyPr>
           <a:lstStyle/>
           <a:p>
             <a:r>
-              <a:rPr lang="en-US" dirty="0" smtClean="0"/>
-              <a:t>All exception classes except those under Error &amp; </a:t>
-            </a:r>
-            <a:r>
-              <a:rPr lang="en-US" dirty="0" err="1" smtClean="0"/>
-              <a:t>RuntimeException</a:t>
-            </a:r>
-            <a:r>
-              <a:rPr lang="en-US" dirty="0" smtClean="0"/>
-              <a:t> are referred to as Checked exceptions. Any user defined exception that extends from these is also a checked exception.</a:t>
-            </a:r>
-          </a:p>
-          <a:p>
-            <a:r>
-              <a:rPr lang="en-US" noProof="1" smtClean="0"/>
-              <a:t>Checked exceptions are those for which the compiler forces the caller to handle the exception explicity. These are those exceptions for which compiler thinks that the caller can successfully recover from.</a:t>
-            </a:r>
-          </a:p>
-          <a:p>
-            <a:r>
-              <a:rPr lang="en-US" noProof="1" smtClean="0"/>
-              <a:t>On the other hand unchecked exceptions are those that compiler wont asks the caller to handle explicitly nd it will be on the diecretion of the programmer to handle them.</a:t>
-            </a:r>
-            <a:endParaRPr lang="en-US" noProof="1"/>
+              <a:rPr lang="en-US" sz="2800" dirty="0" smtClean="0"/>
+              <a:t>Exceptions in a constructor are no different than any other method except for one case which is in the case of super-sub class relationship.</a:t>
+            </a:r>
+          </a:p>
+          <a:p>
+            <a:r>
+              <a:rPr lang="en-US" sz="2800" dirty="0" smtClean="0"/>
+              <a:t>If the super class constructor declares an exception in the throws clause then the subclass must also declare in its throws clause an exception of same class or higher.</a:t>
+            </a:r>
+          </a:p>
+          <a:p>
+            <a:r>
+              <a:rPr lang="en-US" sz="2800" dirty="0" smtClean="0"/>
+              <a:t>Normally we should handle all the exceptions and do something in  catch block to recover from it like log the exception or print the tack trace.</a:t>
+            </a:r>
+          </a:p>
+          <a:p>
+            <a:r>
+              <a:rPr lang="en-US" sz="2800" dirty="0" smtClean="0"/>
+              <a:t>Try block can be nested within another try block.</a:t>
+            </a:r>
+          </a:p>
+          <a:p>
+            <a:r>
+              <a:rPr lang="en-US" sz="2800" dirty="0" smtClean="0"/>
+              <a:t>Exception can also be thrown from a catch or </a:t>
+            </a:r>
+            <a:r>
+              <a:rPr lang="en-US" sz="2800" smtClean="0"/>
+              <a:t>finally block.</a:t>
+            </a:r>
+            <a:endParaRPr lang="en-US" sz="2800" dirty="0" smtClean="0"/>
+          </a:p>
+          <a:p>
+            <a:endParaRPr lang="en-US" sz="2800" dirty="0" smtClean="0"/>
           </a:p>
         </p:txBody>
       </p:sp>
@@ -8293,51 +8522,10 @@
           </a:p>
         </p:txBody>
       </p:sp>
-      <p:pic>
-        <p:nvPicPr>
-          <p:cNvPr id="8" name="Picture 10" descr="Java - Exceptions - Tutorialspoint"/>
-          <p:cNvPicPr>
-            <a:picLocks noChangeAspect="1" noChangeArrowheads="1"/>
-          </p:cNvPicPr>
-          <p:nvPr/>
-        </p:nvPicPr>
-        <p:blipFill>
-          <a:blip r:embed="rId2">
-            <a:extLst>
-              <a:ext uri="{28A0092B-C50C-407E-A947-70E740481C1C}">
-                <a14:useLocalDpi xmlns:a14="http://schemas.microsoft.com/office/drawing/2010/main" val="0"/>
-              </a:ext>
-            </a:extLst>
-          </a:blip>
-          <a:srcRect/>
-          <a:stretch>
-            <a:fillRect/>
-          </a:stretch>
-        </p:blipFill>
-        <p:spPr bwMode="auto">
-          <a:xfrm>
-            <a:off x="7924800" y="1978891"/>
-            <a:ext cx="3428998" cy="4198072"/>
-          </a:xfrm>
-          <a:prstGeom prst="rect">
-            <a:avLst/>
-          </a:prstGeom>
-          <a:noFill/>
-          <a:extLst>
-            <a:ext uri="{909E8E84-426E-40DD-AFC4-6F175D3DCCD1}">
-              <a14:hiddenFill xmlns:a14="http://schemas.microsoft.com/office/drawing/2010/main">
-                <a:solidFill>
-                  <a:srgbClr val="FFFFFF"/>
-                </a:solidFill>
-              </a14:hiddenFill>
-            </a:ext>
-          </a:extLst>
-        </p:spPr>
-      </p:pic>
     </p:spTree>
     <p:extLst>
       <p:ext uri="{BB962C8B-B14F-4D97-AF65-F5344CB8AC3E}">
-        <p14:creationId xmlns:p14="http://schemas.microsoft.com/office/powerpoint/2010/main" val="3546705181"/>
+        <p14:creationId xmlns:p14="http://schemas.microsoft.com/office/powerpoint/2010/main" val="2549937363"/>
       </p:ext>
     </p:extLst>
   </p:cSld>
@@ -10154,21 +10342,13 @@
           <a:p>
             <a:r>
               <a:rPr lang="en-US" sz="2800" dirty="0" smtClean="0"/>
-              <a:t>For an object of inheriting class, state consist if its data members along with the members of the parent class. Hence</a:t>
-            </a:r>
+              <a:t>For an object of inheriting class, state consist if its data members along with the members of the parent class. Hence the object initialization process consists of initializing the state of the members from the current class as well as the parent.</a:t>
+            </a:r>
+          </a:p>
+          <a:p>
             <a:r>
               <a:rPr lang="en-US" sz="2800" dirty="0" smtClean="0"/>
-              <a:t> the object initialization process consists of initializing the state of the members from the current class as well as the parent.</a:t>
-            </a:r>
-          </a:p>
-          <a:p>
-            <a:r>
-              <a:rPr lang="en-US" sz="2800" dirty="0" smtClean="0"/>
-              <a:t>For this purpose, JVM provides a super() constructo</a:t>
-            </a:r>
-            <a:r>
-              <a:rPr lang="en-US" sz="2800" dirty="0" smtClean="0"/>
-              <a:t>r call for calling the parent class constructor which would initialize the parent class members.</a:t>
+              <a:t>For this purpose, JVM provides a super() constructor call for calling the parent class constructor which would initialize the parent class members.</a:t>
             </a:r>
           </a:p>
           <a:p>
@@ -11180,6 +11360,24 @@
 </file>
 
 <file path=customXml/item1.xml><?xml version="1.0" encoding="utf-8"?>
+<?mso-contentType ?>
+<FormTemplates xmlns="http://schemas.microsoft.com/sharepoint/v3/contenttype/forms">
+  <Display>DocumentLibraryForm</Display>
+  <Edit>DocumentLibraryForm</Edit>
+  <New>DocumentLibraryForm</New>
+</FormTemplates>
+</file>
+
+<file path=customXml/item2.xml><?xml version="1.0" encoding="utf-8"?>
+<p:properties xmlns:p="http://schemas.microsoft.com/office/2006/metadata/properties" xmlns:xsi="http://www.w3.org/2001/XMLSchema-instance" xmlns:pc="http://schemas.microsoft.com/office/infopath/2007/PartnerControls">
+  <documentManagement>
+    <Status xmlns="71af3243-3dd4-4a8d-8c0d-dd76da1f02a5">Not started</Status>
+    <MediaServiceKeyPoints xmlns="71af3243-3dd4-4a8d-8c0d-dd76da1f02a5" xsi:nil="true"/>
+  </documentManagement>
+</p:properties>
+</file>
+
+<file path=customXml/item3.xml><?xml version="1.0" encoding="utf-8"?>
 <ct:contentTypeSchema xmlns:ct="http://schemas.microsoft.com/office/2006/metadata/contentType" xmlns:ma="http://schemas.microsoft.com/office/2006/metadata/properties/metaAttributes" ct:_="" ma:_="" ma:contentTypeName="Document" ma:contentTypeID="0x01010079F111ED35F8CC479449609E8A0923A6" ma:contentTypeVersion="12" ma:contentTypeDescription="Create a new document." ma:contentTypeScope="" ma:versionID="fa6e671f1cd7e4d96ff9652be322dd5e">
   <xsd:schema xmlns:xsd="http://www.w3.org/2001/XMLSchema" xmlns:xs="http://www.w3.org/2001/XMLSchema" xmlns:p="http://schemas.microsoft.com/office/2006/metadata/properties" xmlns:ns2="71af3243-3dd4-4a8d-8c0d-dd76da1f02a5" xmlns:ns3="16c05727-aa75-4e4a-9b5f-8a80a1165891" targetNamespace="http://schemas.microsoft.com/office/2006/metadata/properties" ma:root="true" ma:fieldsID="4e2496f70b101db0b8013f30a071bbf7" ns2:_="" ns3:_="">
     <xsd:import namespace="71af3243-3dd4-4a8d-8c0d-dd76da1f02a5"/>
@@ -11400,25 +11598,25 @@
 </ct:contentTypeSchema>
 </file>
 
-<file path=customXml/item2.xml><?xml version="1.0" encoding="utf-8"?>
-<p:properties xmlns:p="http://schemas.microsoft.com/office/2006/metadata/properties" xmlns:xsi="http://www.w3.org/2001/XMLSchema-instance" xmlns:pc="http://schemas.microsoft.com/office/infopath/2007/PartnerControls">
-  <documentManagement>
-    <Status xmlns="71af3243-3dd4-4a8d-8c0d-dd76da1f02a5">Not started</Status>
-    <MediaServiceKeyPoints xmlns="71af3243-3dd4-4a8d-8c0d-dd76da1f02a5" xsi:nil="true"/>
-  </documentManagement>
-</p:properties>
+<file path=customXml/itemProps1.xml><?xml version="1.0" encoding="utf-8"?>
+<ds:datastoreItem xmlns:ds="http://schemas.openxmlformats.org/officeDocument/2006/customXml" ds:itemID="{EBB7C387-AFDC-4FE3-A658-984B7F35F155}">
+  <ds:schemaRefs>
+    <ds:schemaRef ds:uri="http://schemas.microsoft.com/sharepoint/v3/contenttype/forms"/>
+  </ds:schemaRefs>
+</ds:datastoreItem>
 </file>
 
-<file path=customXml/item3.xml><?xml version="1.0" encoding="utf-8"?>
-<?mso-contentType ?>
-<FormTemplates xmlns="http://schemas.microsoft.com/sharepoint/v3/contenttype/forms">
-  <Display>DocumentLibraryForm</Display>
-  <Edit>DocumentLibraryForm</Edit>
-  <New>DocumentLibraryForm</New>
-</FormTemplates>
+<file path=customXml/itemProps2.xml><?xml version="1.0" encoding="utf-8"?>
+<ds:datastoreItem xmlns:ds="http://schemas.openxmlformats.org/officeDocument/2006/customXml" ds:itemID="{F4E32C0B-4052-44CB-9341-8AD8B2CC4712}">
+  <ds:schemaRefs>
+    <ds:schemaRef ds:uri="http://schemas.microsoft.com/office/2006/metadata/properties"/>
+    <ds:schemaRef ds:uri="http://schemas.microsoft.com/office/infopath/2007/PartnerControls"/>
+    <ds:schemaRef ds:uri="71af3243-3dd4-4a8d-8c0d-dd76da1f02a5"/>
+  </ds:schemaRefs>
+</ds:datastoreItem>
 </file>
 
-<file path=customXml/itemProps1.xml><?xml version="1.0" encoding="utf-8"?>
+<file path=customXml/itemProps3.xml><?xml version="1.0" encoding="utf-8"?>
 <ds:datastoreItem xmlns:ds="http://schemas.openxmlformats.org/officeDocument/2006/customXml" ds:itemID="{D6766BD6-F648-49AA-B7EC-13E75CECB99A}">
   <ds:schemaRefs>
     <ds:schemaRef ds:uri="http://schemas.microsoft.com/office/2006/metadata/contentType"/>
@@ -11435,22 +11633,4 @@
     <ds:schemaRef ds:uri="http://schemas.microsoft.com/internal/obd"/>
   </ds:schemaRefs>
 </ds:datastoreItem>
-</file>
-
-<file path=customXml/itemProps2.xml><?xml version="1.0" encoding="utf-8"?>
-<ds:datastoreItem xmlns:ds="http://schemas.openxmlformats.org/officeDocument/2006/customXml" ds:itemID="{F4E32C0B-4052-44CB-9341-8AD8B2CC4712}">
-  <ds:schemaRefs>
-    <ds:schemaRef ds:uri="http://schemas.microsoft.com/office/2006/metadata/properties"/>
-    <ds:schemaRef ds:uri="http://schemas.microsoft.com/office/infopath/2007/PartnerControls"/>
-    <ds:schemaRef ds:uri="71af3243-3dd4-4a8d-8c0d-dd76da1f02a5"/>
-  </ds:schemaRefs>
-</ds:datastoreItem>
-</file>
-
-<file path=customXml/itemProps3.xml><?xml version="1.0" encoding="utf-8"?>
-<ds:datastoreItem xmlns:ds="http://schemas.openxmlformats.org/officeDocument/2006/customXml" ds:itemID="{EBB7C387-AFDC-4FE3-A658-984B7F35F155}">
-  <ds:schemaRefs>
-    <ds:schemaRef ds:uri="http://schemas.microsoft.com/sharepoint/v3/contenttype/forms"/>
-  </ds:schemaRefs>
-</ds:datastoreItem>
 </file>
</xml_diff>

<commit_message>
Committing changes for inheritance and interfaces.
</commit_message>
<xml_diff>
--- a/courseMaterial/Inheritance/Inheritance.pptx
+++ b/courseMaterial/Inheritance/Inheritance.pptx
@@ -5,10 +5,10 @@
     <p:sldMasterId id="2147483648" r:id="rId4"/>
   </p:sldMasterIdLst>
   <p:notesMasterIdLst>
-    <p:notesMasterId r:id="rId29"/>
+    <p:notesMasterId r:id="rId30"/>
   </p:notesMasterIdLst>
   <p:handoutMasterIdLst>
-    <p:handoutMasterId r:id="rId30"/>
+    <p:handoutMasterId r:id="rId31"/>
   </p:handoutMasterIdLst>
   <p:sldIdLst>
     <p:sldId id="256" r:id="rId5"/>
@@ -32,9 +32,10 @@
     <p:sldId id="302" r:id="rId23"/>
     <p:sldId id="298" r:id="rId24"/>
     <p:sldId id="316" r:id="rId25"/>
-    <p:sldId id="306" r:id="rId26"/>
+    <p:sldId id="317" r:id="rId26"/>
     <p:sldId id="307" r:id="rId27"/>
-    <p:sldId id="268" r:id="rId28"/>
+    <p:sldId id="318" r:id="rId28"/>
+    <p:sldId id="268" r:id="rId29"/>
   </p:sldIdLst>
   <p:sldSz cx="12192000" cy="6858000"/>
   <p:notesSz cx="6858000" cy="9144000"/>
@@ -238,7 +239,7 @@
           <a:p>
             <a:fld id="{68416927-5E9C-4E77-85FE-EE4C81C1DE39}" type="datetimeFigureOut">
               <a:rPr lang="en-US" smtClean="0"/>
-              <a:t>4/28/2020</a:t>
+              <a:t>4/29/2020</a:t>
             </a:fld>
             <a:endParaRPr lang="en-US" dirty="0"/>
           </a:p>
@@ -415,7 +416,7 @@
           <a:p>
             <a:fld id="{FA798B7E-6604-4F74-86DB-B30627D56244}" type="datetimeFigureOut">
               <a:rPr lang="en-US" smtClean="0"/>
-              <a:t>4/28/2020</a:t>
+              <a:t>4/29/2020</a:t>
             </a:fld>
             <a:endParaRPr lang="en-US" dirty="0"/>
           </a:p>
@@ -6231,11 +6232,7 @@
           <a:p>
             <a:r>
               <a:rPr lang="en-US" sz="2800" dirty="0" smtClean="0"/>
-              <a:t>Inheritance provides </a:t>
-            </a:r>
-            <a:r>
-              <a:rPr lang="en-US" sz="2800" dirty="0" smtClean="0"/>
-              <a:t>us the luxury of using things from our parents, its like getting the to the hidden reassure of riches from my father. I can use it with no additional efforts.</a:t>
+              <a:t>Inheritance provides us the luxury of using things from our parents, its like getting the to the hidden reassure of riches from my father. I can use it with no additional efforts.</a:t>
             </a:r>
           </a:p>
           <a:p>
@@ -7911,7 +7908,7 @@
         </p:spPr>
         <p:txBody>
           <a:bodyPr>
-            <a:normAutofit/>
+            <a:normAutofit fontScale="77500" lnSpcReduction="20000"/>
           </a:bodyPr>
           <a:lstStyle/>
           <a:p>
@@ -7949,7 +7946,27 @@
           <a:p>
             <a:r>
               <a:rPr lang="en-US" dirty="0" smtClean="0"/>
-              <a:t>This makes a perfect example for </a:t>
+              <a:t>Similarly we have “final” methods in java. These methods prevent the subclasses from overriding the final method.</a:t>
+            </a:r>
+          </a:p>
+          <a:p>
+            <a:r>
+              <a:rPr lang="en-US" dirty="0" smtClean="0"/>
+              <a:t>Unlike “final” classes, in case of “final” method a parent class can be extended completely except that its final methods cannot be overridden by the child class.</a:t>
+            </a:r>
+          </a:p>
+          <a:p>
+            <a:r>
+              <a:rPr lang="en-US" dirty="0" smtClean="0"/>
+              <a:t>Declaring a static method “final”, prevents it from getting hidden by the subclass method. In case we try to declare a method with same signature as parent then compiler raises an exception. This exception that compiler raises is incorrectly </a:t>
+            </a:r>
+            <a:r>
+              <a:rPr lang="en-US" smtClean="0"/>
+              <a:t>written and </a:t>
+            </a:r>
+            <a:r>
+              <a:rPr lang="en-US" dirty="0" smtClean="0"/>
+              <a:t>should I ideally say hiding instead of overriding.</a:t>
             </a:r>
           </a:p>
         </p:txBody>
@@ -8136,8 +8153,8 @@
         </p:nvSpPr>
         <p:spPr>
           <a:xfrm>
-            <a:off x="838199" y="641857"/>
-            <a:ext cx="10515600" cy="772107"/>
+            <a:off x="838199" y="611079"/>
+            <a:ext cx="10515600" cy="833663"/>
           </a:xfrm>
         </p:spPr>
         <p:txBody>
@@ -8146,10 +8163,10 @@
           <a:p>
             <a:pPr algn="ctr"/>
             <a:r>
-              <a:rPr lang="en-US" sz="3600" dirty="0" smtClean="0"/>
-              <a:t>The “final” methods</a:t>
-            </a:r>
-            <a:endParaRPr lang="en-US" sz="3600" dirty="0"/>
+              <a:rPr lang="en-US" dirty="0" smtClean="0"/>
+              <a:t>Compiler: Developers true well wisher</a:t>
+            </a:r>
+            <a:endParaRPr lang="en-US" dirty="0"/>
           </a:p>
         </p:txBody>
       </p:sp>
@@ -8171,8 +8188,8 @@
         </p:nvSpPr>
         <p:spPr>
           <a:xfrm>
-            <a:off x="838199" y="1625600"/>
-            <a:ext cx="10515599" cy="4551363"/>
+            <a:off x="838199" y="1689822"/>
+            <a:ext cx="6310746" cy="4487141"/>
           </a:xfrm>
         </p:spPr>
         <p:txBody>
@@ -8182,10 +8199,48 @@
           <a:lstStyle/>
           <a:p>
             <a:r>
-              <a:rPr lang="en-US" sz="2800" dirty="0" smtClean="0"/>
-              <a:t>Open source code is something ever</a:t>
-            </a:r>
-            <a:endParaRPr lang="en-US" sz="2800" dirty="0" smtClean="0"/>
+              <a:rPr lang="en-US" dirty="0" smtClean="0"/>
+              <a:t>Ever saw a soccer coach, prepare his kids for the game. Why does he do that? To ensure that when they go out there in a real game they are able to give their best.</a:t>
+            </a:r>
+          </a:p>
+          <a:p>
+            <a:r>
+              <a:rPr lang="en-US" dirty="0" smtClean="0"/>
+              <a:t>What does a coach do for this ? He points out each and every mistakes to his kids and ensures that every kid works on them, so that in a real game they come out with </a:t>
+            </a:r>
+            <a:r>
+              <a:rPr lang="en-US" dirty="0" smtClean="0"/>
+              <a:t>flying </a:t>
+            </a:r>
+            <a:r>
+              <a:rPr lang="en-US" dirty="0" smtClean="0"/>
+              <a:t>colors.</a:t>
+            </a:r>
+          </a:p>
+          <a:p>
+            <a:r>
+              <a:rPr lang="en-US" dirty="0" smtClean="0"/>
+              <a:t>In the programmers world, none other than the compiler is our true </a:t>
+            </a:r>
+            <a:r>
+              <a:rPr lang="en-US" dirty="0" smtClean="0"/>
+              <a:t>well </a:t>
+            </a:r>
+            <a:r>
+              <a:rPr lang="en-US" dirty="0" smtClean="0"/>
+              <a:t>wisher</a:t>
+            </a:r>
+            <a:r>
+              <a:rPr lang="en-US" dirty="0" smtClean="0"/>
+              <a:t>.</a:t>
+            </a:r>
+          </a:p>
+          <a:p>
+            <a:r>
+              <a:rPr lang="en-US" dirty="0" smtClean="0"/>
+              <a:t>Lets see , How ????</a:t>
+            </a:r>
+            <a:endParaRPr lang="en-US" dirty="0" smtClean="0"/>
           </a:p>
         </p:txBody>
       </p:sp>
@@ -8286,10 +8341,40 @@
           </a:p>
         </p:txBody>
       </p:sp>
+      <p:pic>
+        <p:nvPicPr>
+          <p:cNvPr id="5" name="Picture 4"/>
+          <p:cNvPicPr>
+            <a:picLocks noChangeAspect="1"/>
+          </p:cNvPicPr>
+          <p:nvPr/>
+        </p:nvPicPr>
+        <p:blipFill>
+          <a:blip r:embed="rId2">
+            <a:extLst>
+              <a:ext uri="{28A0092B-C50C-407E-A947-70E740481C1C}">
+                <a14:useLocalDpi xmlns:a14="http://schemas.microsoft.com/office/drawing/2010/main" val="0"/>
+              </a:ext>
+            </a:extLst>
+          </a:blip>
+          <a:stretch>
+            <a:fillRect/>
+          </a:stretch>
+        </p:blipFill>
+        <p:spPr>
+          <a:xfrm>
+            <a:off x="7278255" y="1689822"/>
+            <a:ext cx="4075544" cy="4671653"/>
+          </a:xfrm>
+          <a:prstGeom prst="rect">
+            <a:avLst/>
+          </a:prstGeom>
+        </p:spPr>
+      </p:pic>
     </p:spTree>
     <p:extLst>
       <p:ext uri="{BB962C8B-B14F-4D97-AF65-F5344CB8AC3E}">
-        <p14:creationId xmlns:p14="http://schemas.microsoft.com/office/powerpoint/2010/main" val="3057752647"/>
+        <p14:creationId xmlns:p14="http://schemas.microsoft.com/office/powerpoint/2010/main" val="495533325"/>
       </p:ext>
     </p:extLst>
   </p:cSld>
@@ -8352,7 +8437,7 @@
             <a:pPr algn="ctr"/>
             <a:r>
               <a:rPr lang="en-US" sz="3600" dirty="0" smtClean="0"/>
-              <a:t>Other Points</a:t>
+              <a:t>Compiler &amp; Polymorphism</a:t>
             </a:r>
             <a:endParaRPr lang="en-US" sz="3600" dirty="0"/>
           </a:p>
@@ -8376,51 +8461,56 @@
         </p:nvSpPr>
         <p:spPr>
           <a:xfrm>
-            <a:off x="838199" y="1825625"/>
-            <a:ext cx="10515599" cy="4351338"/>
+            <a:off x="838199" y="1625600"/>
+            <a:ext cx="10515599" cy="4735875"/>
           </a:xfrm>
         </p:spPr>
         <p:txBody>
           <a:bodyPr>
-            <a:normAutofit fontScale="92500"/>
+            <a:normAutofit fontScale="92500" lnSpcReduction="10000"/>
           </a:bodyPr>
           <a:lstStyle/>
           <a:p>
             <a:r>
               <a:rPr lang="en-US" sz="2800" dirty="0" smtClean="0"/>
-              <a:t>Exceptions in a constructor are no different than any other method except for one case which is in the case of super-sub class relationship.</a:t>
-            </a:r>
-          </a:p>
-          <a:p>
+              <a:t>Due to polymorphic behavior, a reference and the object it points to can be completely different. This is possible because in </a:t>
+            </a:r>
             <a:r>
               <a:rPr lang="en-US" sz="2800" dirty="0" smtClean="0"/>
-              <a:t>If the super class constructor declares an exception in the throws clause then the subclass must also declare in its throws clause an exception of same class or higher.</a:t>
-            </a:r>
-          </a:p>
-          <a:p>
+              <a:t>the case of </a:t>
+            </a:r>
             <a:r>
               <a:rPr lang="en-US" sz="2800" dirty="0" smtClean="0"/>
-              <a:t>Normally we should handle all the exceptions and do something in  catch block to recover from it like log the exception or print the tack trace.</a:t>
+              <a:t>inheritance a class higher in the hierarchy can point to an object that is lower in the hierarchy.</a:t>
             </a:r>
           </a:p>
           <a:p>
             <a:r>
               <a:rPr lang="en-US" sz="2800" dirty="0" smtClean="0"/>
-              <a:t>Try block can be nested within another try block.</a:t>
+              <a:t> Example : A reference of Object class can point to an object of String class.</a:t>
             </a:r>
           </a:p>
           <a:p>
             <a:r>
               <a:rPr lang="en-US" sz="2800" dirty="0" smtClean="0"/>
-              <a:t>Exception can also be thrown from a catch or </a:t>
-            </a:r>
-            <a:r>
-              <a:rPr lang="en-US" sz="2800" smtClean="0"/>
-              <a:t>finally block.</a:t>
-            </a:r>
-            <a:endParaRPr lang="en-US" sz="2800" dirty="0" smtClean="0"/>
-          </a:p>
-          <a:p>
+              <a:t>Due to polymorphic behavior, at compile time only type of the reference is known while no whereabouts of the actual object can be known.</a:t>
+            </a:r>
+          </a:p>
+          <a:p>
+            <a:r>
+              <a:rPr lang="en-US" sz="2800" dirty="0" smtClean="0"/>
+              <a:t>As a result of above fact, during assignment of one reference type to other, the compiler ensures that references on the right hand side of the assignment operator(=) always is a subclass of the reference type on the left hand side. This essentially means right hand side reference has “is a” relationship with the reference type on the left hand side.</a:t>
+            </a:r>
+          </a:p>
+          <a:p>
+            <a:r>
+              <a:rPr lang="en-US" sz="2800" dirty="0" smtClean="0"/>
+              <a:t>For example, Fruit f = m(mango type). Here mango </a:t>
+            </a:r>
+            <a:r>
+              <a:rPr lang="en-US" sz="2800" dirty="0" smtClean="0"/>
+              <a:t>“is a” fruit.</a:t>
+            </a:r>
             <a:endParaRPr lang="en-US" sz="2800" dirty="0" smtClean="0"/>
           </a:p>
         </p:txBody>
@@ -8564,6 +8654,211 @@
           <p:cNvPr id="2" name="Title 1">
             <a:extLst>
               <a:ext uri="{FF2B5EF4-FFF2-40B4-BE49-F238E27FC236}">
+                <a16:creationId xmlns:a16="http://schemas.microsoft.com/office/drawing/2014/main" id="{E199600F-A17E-4354-A7AB-0CC2A43A9354}"/>
+              </a:ext>
+            </a:extLst>
+          </p:cNvPr>
+          <p:cNvSpPr>
+            <a:spLocks noGrp="1"/>
+          </p:cNvSpPr>
+          <p:nvPr>
+            <p:ph type="title"/>
+          </p:nvPr>
+        </p:nvSpPr>
+        <p:spPr>
+          <a:xfrm>
+            <a:off x="838199" y="641857"/>
+            <a:ext cx="10515600" cy="772107"/>
+          </a:xfrm>
+        </p:spPr>
+        <p:txBody>
+          <a:bodyPr/>
+          <a:lstStyle/>
+          <a:p>
+            <a:pPr algn="ctr"/>
+            <a:r>
+              <a:rPr lang="en-US" sz="3600" dirty="0" smtClean="0"/>
+              <a:t>Casting</a:t>
+            </a:r>
+            <a:endParaRPr lang="en-US" sz="3600" dirty="0"/>
+          </a:p>
+        </p:txBody>
+      </p:sp>
+      <p:sp>
+        <p:nvSpPr>
+          <p:cNvPr id="3" name="Content Placeholder 2">
+            <a:extLst>
+              <a:ext uri="{FF2B5EF4-FFF2-40B4-BE49-F238E27FC236}">
+                <a16:creationId xmlns:a16="http://schemas.microsoft.com/office/drawing/2014/main" id="{FA6A4B49-27C8-46B6-8B11-AD7E8F615E2C}"/>
+              </a:ext>
+            </a:extLst>
+          </p:cNvPr>
+          <p:cNvSpPr>
+            <a:spLocks noGrp="1"/>
+          </p:cNvSpPr>
+          <p:nvPr>
+            <p:ph idx="1"/>
+          </p:nvPr>
+        </p:nvSpPr>
+        <p:spPr>
+          <a:xfrm>
+            <a:off x="838199" y="1542474"/>
+            <a:ext cx="10515599" cy="5019530"/>
+          </a:xfrm>
+        </p:spPr>
+        <p:txBody>
+          <a:bodyPr>
+            <a:normAutofit/>
+          </a:bodyPr>
+          <a:lstStyle/>
+          <a:p>
+            <a:r>
+              <a:rPr lang="en-US" sz="2800" dirty="0" smtClean="0"/>
+              <a:t>Though the compiler ensures that only subclass reference type be assigned to a parent class reference, there are loopholes in this approach.</a:t>
+            </a:r>
+            <a:endParaRPr lang="en-US" sz="2800" dirty="0" smtClean="0"/>
+          </a:p>
+        </p:txBody>
+      </p:sp>
+      <p:sp>
+        <p:nvSpPr>
+          <p:cNvPr id="4" name="Slide Number Placeholder 3">
+            <a:extLst>
+              <a:ext uri="{FF2B5EF4-FFF2-40B4-BE49-F238E27FC236}">
+                <a16:creationId xmlns:a16="http://schemas.microsoft.com/office/drawing/2014/main" id="{62B4CE3A-8C88-45AA-A849-57E5A7AC22C1}"/>
+              </a:ext>
+            </a:extLst>
+          </p:cNvPr>
+          <p:cNvSpPr>
+            <a:spLocks noGrp="1"/>
+          </p:cNvSpPr>
+          <p:nvPr>
+            <p:ph type="sldNum" sz="quarter" idx="10"/>
+          </p:nvPr>
+        </p:nvSpPr>
+        <p:spPr>
+          <a:xfrm>
+            <a:off x="11353800" y="6361475"/>
+            <a:ext cx="838200" cy="360000"/>
+          </a:xfrm>
+        </p:spPr>
+        <p:txBody>
+          <a:bodyPr/>
+          <a:lstStyle/>
+          <a:p>
+            <a:r>
+              <a:rPr lang="en-US" dirty="0"/>
+              <a:t>PAGE </a:t>
+            </a:r>
+            <a:fld id="{4A9B5881-4007-4345-955A-79C2656F0C49}" type="slidenum">
+              <a:rPr lang="en-US" smtClean="0"/>
+              <a:pPr/>
+              <a:t>24</a:t>
+            </a:fld>
+            <a:endParaRPr lang="en-US" dirty="0"/>
+          </a:p>
+        </p:txBody>
+      </p:sp>
+      <p:sp>
+        <p:nvSpPr>
+          <p:cNvPr id="11" name="Rectangle 10">
+            <a:extLst>
+              <a:ext uri="{FF2B5EF4-FFF2-40B4-BE49-F238E27FC236}">
+                <a16:creationId xmlns:a16="http://schemas.microsoft.com/office/drawing/2014/main" id="{5F253864-26FA-4AB1-9F0A-4F57D870EE85}"/>
+              </a:ext>
+              <a:ext uri="{C183D7F6-B498-43B3-948B-1728B52AA6E4}">
+                <adec:decorative xmlns:adec="http://schemas.microsoft.com/office/drawing/2017/decorative" xmlns="" val="1"/>
+              </a:ext>
+            </a:extLst>
+          </p:cNvPr>
+          <p:cNvSpPr/>
+          <p:nvPr/>
+        </p:nvSpPr>
+        <p:spPr>
+          <a:xfrm>
+            <a:off x="6249555" y="6562004"/>
+            <a:ext cx="2552123" cy="159471"/>
+          </a:xfrm>
+          <a:prstGeom prst="rect">
+            <a:avLst/>
+          </a:prstGeom>
+          <a:solidFill>
+            <a:schemeClr val="tx1">
+              <a:lumMod val="85000"/>
+              <a:lumOff val="15000"/>
+            </a:schemeClr>
+          </a:solidFill>
+          <a:ln>
+            <a:noFill/>
+          </a:ln>
+        </p:spPr>
+        <p:style>
+          <a:lnRef idx="2">
+            <a:schemeClr val="accent1">
+              <a:shade val="50000"/>
+            </a:schemeClr>
+          </a:lnRef>
+          <a:fillRef idx="1">
+            <a:schemeClr val="accent1"/>
+          </a:fillRef>
+          <a:effectRef idx="0">
+            <a:schemeClr val="accent1"/>
+          </a:effectRef>
+          <a:fontRef idx="minor">
+            <a:schemeClr val="lt1"/>
+          </a:fontRef>
+        </p:style>
+        <p:txBody>
+          <a:bodyPr anchor="ctr"/>
+          <a:lstStyle/>
+          <a:p>
+            <a:pPr algn="ctr"/>
+            <a:endParaRPr lang="en-US" sz="1200" dirty="0"/>
+          </a:p>
+        </p:txBody>
+      </p:sp>
+    </p:spTree>
+    <p:extLst>
+      <p:ext uri="{BB962C8B-B14F-4D97-AF65-F5344CB8AC3E}">
+        <p14:creationId xmlns:p14="http://schemas.microsoft.com/office/powerpoint/2010/main" val="2912250523"/>
+      </p:ext>
+    </p:extLst>
+  </p:cSld>
+  <p:clrMapOvr>
+    <a:masterClrMapping/>
+  </p:clrMapOvr>
+  <p:timing>
+    <p:tnLst>
+      <p:par>
+        <p:cTn id="1" dur="indefinite" restart="never" nodeType="tmRoot"/>
+      </p:par>
+    </p:tnLst>
+  </p:timing>
+</p:sld>
+</file>
+
+<file path=ppt/slides/slide25.xml><?xml version="1.0" encoding="utf-8"?>
+<p:sld xmlns:a="http://schemas.openxmlformats.org/drawingml/2006/main" xmlns:r="http://schemas.openxmlformats.org/officeDocument/2006/relationships" xmlns:p="http://schemas.openxmlformats.org/presentationml/2006/main">
+  <p:cSld>
+    <p:spTree>
+      <p:nvGrpSpPr>
+        <p:cNvPr id="1" name=""/>
+        <p:cNvGrpSpPr/>
+        <p:nvPr/>
+      </p:nvGrpSpPr>
+      <p:grpSpPr>
+        <a:xfrm>
+          <a:off x="0" y="0"/>
+          <a:ext cx="0" cy="0"/>
+          <a:chOff x="0" y="0"/>
+          <a:chExt cx="0" cy="0"/>
+        </a:xfrm>
+      </p:grpSpPr>
+      <p:sp>
+        <p:nvSpPr>
+          <p:cNvPr id="2" name="Title 1">
+            <a:extLst>
+              <a:ext uri="{FF2B5EF4-FFF2-40B4-BE49-F238E27FC236}">
                 <a16:creationId xmlns:a16="http://schemas.microsoft.com/office/drawing/2014/main" id="{C8F58AE6-56F6-44E8-8BBF-23277B1773E4}"/>
               </a:ext>
             </a:extLst>
@@ -8650,7 +8945,7 @@
             <a:fld id="{4A9B5881-4007-4345-955A-79C2656F0C49}" type="slidenum">
               <a:rPr lang="en-US" smtClean="0"/>
               <a:pPr/>
-              <a:t>24</a:t>
+              <a:t>25</a:t>
             </a:fld>
             <a:endParaRPr lang="en-US" dirty="0"/>
           </a:p>
@@ -9855,13 +10150,8 @@
           <a:p>
             <a:r>
               <a:rPr lang="en-US" sz="2600" dirty="0" smtClean="0"/>
-              <a:t>If the parent class contains a static member, then child class also shares the same copy of the static </a:t>
-            </a:r>
-            <a:r>
-              <a:rPr lang="en-US" sz="2600" smtClean="0"/>
-              <a:t>member.</a:t>
-            </a:r>
-            <a:endParaRPr lang="en-US" sz="2600" dirty="0" smtClean="0"/>
+              <a:t>If the parent class contains a static member, then child class also shares the same copy of the static member.</a:t>
+            </a:r>
           </a:p>
           <a:p>
             <a:r>

</xml_diff>